<commit_message>
[#101450680] rev ppt PoE
</commit_message>
<xml_diff>
--- a/Portfolio TRENDnet - PoE/en-us.PoE.2015Q3.Network1TV.pptx
+++ b/Portfolio TRENDnet - PoE/en-us.PoE.2015Q3.Network1TV.pptx
@@ -134,7 +134,7 @@
   </p:defaultTextStyle>
   <p:extLst>
     <p:ext uri="{EFAFB233-063F-42B5-8137-9DF3F51BA10A}">
-      <p15:sldGuideLst xmlns:p15="http://schemas.microsoft.com/office/powerpoint/2012/main" xmlns="">
+      <p15:sldGuideLst xmlns="" xmlns:p15="http://schemas.microsoft.com/office/powerpoint/2012/main">
         <p15:guide id="1" orient="horz" pos="2160" userDrawn="1">
           <p15:clr>
             <a:srgbClr val="A4A3A4"/>
@@ -226,7 +226,7 @@
             <a:fld id="{A7959C71-B73A-49FF-9308-B24F710812B5}" type="datetimeFigureOut">
               <a:rPr lang="en-US" smtClean="0"/>
               <a:pPr/>
-              <a:t>8/13/2015</a:t>
+              <a:t>8/18/2015</a:t>
             </a:fld>
             <a:endParaRPr lang="en-US" dirty="0"/>
           </a:p>
@@ -294,7 +294,7 @@
     </p:spTree>
     <p:extLst>
       <p:ext uri="{BB962C8B-B14F-4D97-AF65-F5344CB8AC3E}">
-        <p14:creationId xmlns:p14="http://schemas.microsoft.com/office/powerpoint/2010/main" xmlns="" val="3390290099"/>
+        <p14:creationId xmlns="" xmlns:p14="http://schemas.microsoft.com/office/powerpoint/2010/main" val="3390290099"/>
       </p:ext>
     </p:extLst>
   </p:cSld>
@@ -377,7 +377,7 @@
             <a:fld id="{5468FC2B-D455-4AC4-9C5E-9317124768F4}" type="datetimeFigureOut">
               <a:rPr lang="en-US" smtClean="0"/>
               <a:pPr/>
-              <a:t>8/13/2015</a:t>
+              <a:t>8/18/2015</a:t>
             </a:fld>
             <a:endParaRPr lang="en-US" dirty="0"/>
           </a:p>
@@ -541,7 +541,7 @@
     </p:spTree>
     <p:extLst>
       <p:ext uri="{BB962C8B-B14F-4D97-AF65-F5344CB8AC3E}">
-        <p14:creationId xmlns:p14="http://schemas.microsoft.com/office/powerpoint/2010/main" xmlns="" val="3912155225"/>
+        <p14:creationId xmlns="" xmlns:p14="http://schemas.microsoft.com/office/powerpoint/2010/main" val="3912155225"/>
       </p:ext>
     </p:extLst>
   </p:cSld>
@@ -723,7 +723,7 @@
     </p:spTree>
     <p:extLst>
       <p:ext uri="{BB962C8B-B14F-4D97-AF65-F5344CB8AC3E}">
-        <p14:creationId xmlns:p14="http://schemas.microsoft.com/office/powerpoint/2010/main" xmlns="" val="85689409"/>
+        <p14:creationId xmlns="" xmlns:p14="http://schemas.microsoft.com/office/powerpoint/2010/main" val="85689409"/>
       </p:ext>
     </p:extLst>
   </p:cSld>
@@ -808,7 +808,7 @@
     </p:spTree>
     <p:extLst>
       <p:ext uri="{BB962C8B-B14F-4D97-AF65-F5344CB8AC3E}">
-        <p14:creationId xmlns:p14="http://schemas.microsoft.com/office/powerpoint/2010/main" xmlns="" val="2801876985"/>
+        <p14:creationId xmlns="" xmlns:p14="http://schemas.microsoft.com/office/powerpoint/2010/main" val="2801876985"/>
       </p:ext>
     </p:extLst>
   </p:cSld>
@@ -893,7 +893,7 @@
     </p:spTree>
     <p:extLst>
       <p:ext uri="{BB962C8B-B14F-4D97-AF65-F5344CB8AC3E}">
-        <p14:creationId xmlns:p14="http://schemas.microsoft.com/office/powerpoint/2010/main" xmlns="" val="2271382243"/>
+        <p14:creationId xmlns="" xmlns:p14="http://schemas.microsoft.com/office/powerpoint/2010/main" val="2271382243"/>
       </p:ext>
     </p:extLst>
   </p:cSld>
@@ -978,7 +978,7 @@
     </p:spTree>
     <p:extLst>
       <p:ext uri="{BB962C8B-B14F-4D97-AF65-F5344CB8AC3E}">
-        <p14:creationId xmlns:p14="http://schemas.microsoft.com/office/powerpoint/2010/main" xmlns="" val="2700717937"/>
+        <p14:creationId xmlns="" xmlns:p14="http://schemas.microsoft.com/office/powerpoint/2010/main" val="2700717937"/>
       </p:ext>
     </p:extLst>
   </p:cSld>
@@ -1027,7 +1027,7 @@
           </a:ln>
           <a:extLst>
             <a:ext uri="{909E8E84-426E-40DD-AFC4-6F175D3DCCD1}">
-              <a14:hiddenFill xmlns:a14="http://schemas.microsoft.com/office/drawing/2010/main" xmlns="">
+              <a14:hiddenFill xmlns="" xmlns:a14="http://schemas.microsoft.com/office/drawing/2010/main">
                 <a:solidFill>
                   <a:srgbClr val="FFFFFF"/>
                 </a:solidFill>
@@ -1050,14 +1050,14 @@
           <a:noFill/>
           <a:extLst>
             <a:ext uri="{909E8E84-426E-40DD-AFC4-6F175D3DCCD1}">
-              <a14:hiddenFill xmlns:a14="http://schemas.microsoft.com/office/drawing/2010/main" xmlns="">
+              <a14:hiddenFill xmlns="" xmlns:a14="http://schemas.microsoft.com/office/drawing/2010/main">
                 <a:solidFill>
                   <a:srgbClr val="FFFFFF"/>
                 </a:solidFill>
               </a14:hiddenFill>
             </a:ext>
             <a:ext uri="{91240B29-F687-4F45-9708-019B960494DF}">
-              <a14:hiddenLine xmlns:a14="http://schemas.microsoft.com/office/drawing/2010/main" xmlns="" w="9525">
+              <a14:hiddenLine xmlns="" xmlns:a14="http://schemas.microsoft.com/office/drawing/2010/main" w="9525">
                 <a:solidFill>
                   <a:srgbClr val="000000"/>
                 </a:solidFill>
@@ -1099,14 +1099,14 @@
           <a:noFill/>
           <a:extLst>
             <a:ext uri="{909E8E84-426E-40DD-AFC4-6F175D3DCCD1}">
-              <a14:hiddenFill xmlns:a14="http://schemas.microsoft.com/office/drawing/2010/main" xmlns="">
+              <a14:hiddenFill xmlns="" xmlns:a14="http://schemas.microsoft.com/office/drawing/2010/main">
                 <a:solidFill>
                   <a:srgbClr val="FFFFFF"/>
                 </a:solidFill>
               </a14:hiddenFill>
             </a:ext>
             <a:ext uri="{91240B29-F687-4F45-9708-019B960494DF}">
-              <a14:hiddenLine xmlns:a14="http://schemas.microsoft.com/office/drawing/2010/main" xmlns="" w="9525">
+              <a14:hiddenLine xmlns="" xmlns:a14="http://schemas.microsoft.com/office/drawing/2010/main" w="9525">
                 <a:solidFill>
                   <a:srgbClr val="000000"/>
                 </a:solidFill>
@@ -1260,14 +1260,14 @@
           <a:noFill/>
           <a:extLst>
             <a:ext uri="{909E8E84-426E-40DD-AFC4-6F175D3DCCD1}">
-              <a14:hiddenFill xmlns:a14="http://schemas.microsoft.com/office/drawing/2010/main" xmlns="">
+              <a14:hiddenFill xmlns="" xmlns:a14="http://schemas.microsoft.com/office/drawing/2010/main">
                 <a:solidFill>
                   <a:srgbClr val="FFFFFF"/>
                 </a:solidFill>
               </a14:hiddenFill>
             </a:ext>
             <a:ext uri="{91240B29-F687-4F45-9708-019B960494DF}">
-              <a14:hiddenLine xmlns:a14="http://schemas.microsoft.com/office/drawing/2010/main" xmlns="" w="9525">
+              <a14:hiddenLine xmlns="" xmlns:a14="http://schemas.microsoft.com/office/drawing/2010/main" w="9525">
                 <a:solidFill>
                   <a:srgbClr val="000000"/>
                 </a:solidFill>
@@ -1401,7 +1401,7 @@
                   <a:spcPct val="0"/>
                 </a:spcAft>
               </a:pPr>
-              <a:t>8/13/2015</a:t>
+              <a:t>8/18/2015</a:t>
             </a:fld>
             <a:endParaRPr lang="en-US"/>
           </a:p>
@@ -1410,7 +1410,7 @@
     </p:spTree>
     <p:extLst>
       <p:ext uri="{BB962C8B-B14F-4D97-AF65-F5344CB8AC3E}">
-        <p14:creationId xmlns:p14="http://schemas.microsoft.com/office/powerpoint/2010/main" xmlns="" val="1336759306"/>
+        <p14:creationId xmlns="" xmlns:p14="http://schemas.microsoft.com/office/powerpoint/2010/main" val="1336759306"/>
       </p:ext>
     </p:extLst>
   </p:cSld>
@@ -1495,7 +1495,7 @@
     </p:spTree>
     <p:extLst>
       <p:ext uri="{BB962C8B-B14F-4D97-AF65-F5344CB8AC3E}">
-        <p14:creationId xmlns:p14="http://schemas.microsoft.com/office/powerpoint/2010/main" xmlns="" val="198596155"/>
+        <p14:creationId xmlns="" xmlns:p14="http://schemas.microsoft.com/office/powerpoint/2010/main" val="198596155"/>
       </p:ext>
     </p:extLst>
   </p:cSld>
@@ -1580,7 +1580,7 @@
     </p:spTree>
     <p:extLst>
       <p:ext uri="{BB962C8B-B14F-4D97-AF65-F5344CB8AC3E}">
-        <p14:creationId xmlns:p14="http://schemas.microsoft.com/office/powerpoint/2010/main" xmlns="" val="993490178"/>
+        <p14:creationId xmlns="" xmlns:p14="http://schemas.microsoft.com/office/powerpoint/2010/main" val="993490178"/>
       </p:ext>
     </p:extLst>
   </p:cSld>
@@ -1665,7 +1665,7 @@
     </p:spTree>
     <p:extLst>
       <p:ext uri="{BB962C8B-B14F-4D97-AF65-F5344CB8AC3E}">
-        <p14:creationId xmlns:p14="http://schemas.microsoft.com/office/powerpoint/2010/main" xmlns="" val="3176697821"/>
+        <p14:creationId xmlns="" xmlns:p14="http://schemas.microsoft.com/office/powerpoint/2010/main" val="3176697821"/>
       </p:ext>
     </p:extLst>
   </p:cSld>
@@ -1750,7 +1750,7 @@
     </p:spTree>
     <p:extLst>
       <p:ext uri="{BB962C8B-B14F-4D97-AF65-F5344CB8AC3E}">
-        <p14:creationId xmlns:p14="http://schemas.microsoft.com/office/powerpoint/2010/main" xmlns="" val="3110606486"/>
+        <p14:creationId xmlns="" xmlns:p14="http://schemas.microsoft.com/office/powerpoint/2010/main" val="3110606486"/>
       </p:ext>
     </p:extLst>
   </p:cSld>
@@ -1835,7 +1835,7 @@
     </p:spTree>
     <p:extLst>
       <p:ext uri="{BB962C8B-B14F-4D97-AF65-F5344CB8AC3E}">
-        <p14:creationId xmlns:p14="http://schemas.microsoft.com/office/powerpoint/2010/main" xmlns="" val="2766747279"/>
+        <p14:creationId xmlns="" xmlns:p14="http://schemas.microsoft.com/office/powerpoint/2010/main" val="2766747279"/>
       </p:ext>
     </p:extLst>
   </p:cSld>
@@ -1920,7 +1920,7 @@
     </p:spTree>
     <p:extLst>
       <p:ext uri="{BB962C8B-B14F-4D97-AF65-F5344CB8AC3E}">
-        <p14:creationId xmlns:p14="http://schemas.microsoft.com/office/powerpoint/2010/main" xmlns="" val="3431614961"/>
+        <p14:creationId xmlns="" xmlns:p14="http://schemas.microsoft.com/office/powerpoint/2010/main" val="3431614961"/>
       </p:ext>
     </p:extLst>
   </p:cSld>
@@ -2005,7 +2005,7 @@
     </p:spTree>
     <p:extLst>
       <p:ext uri="{BB962C8B-B14F-4D97-AF65-F5344CB8AC3E}">
-        <p14:creationId xmlns:p14="http://schemas.microsoft.com/office/powerpoint/2010/main" xmlns="" val="1878671997"/>
+        <p14:creationId xmlns="" xmlns:p14="http://schemas.microsoft.com/office/powerpoint/2010/main" val="1878671997"/>
       </p:ext>
     </p:extLst>
   </p:cSld>
@@ -2090,7 +2090,7 @@
     </p:spTree>
     <p:extLst>
       <p:ext uri="{BB962C8B-B14F-4D97-AF65-F5344CB8AC3E}">
-        <p14:creationId xmlns:p14="http://schemas.microsoft.com/office/powerpoint/2010/main" xmlns="" val="3499781687"/>
+        <p14:creationId xmlns="" xmlns:p14="http://schemas.microsoft.com/office/powerpoint/2010/main" val="3499781687"/>
       </p:ext>
     </p:extLst>
   </p:cSld>
@@ -3357,7 +3357,7 @@
     </p:spTree>
     <p:extLst>
       <p:ext uri="{BB962C8B-B14F-4D97-AF65-F5344CB8AC3E}">
-        <p14:creationId xmlns:p14="http://schemas.microsoft.com/office/powerpoint/2010/main" xmlns="" val="2912836156"/>
+        <p14:creationId xmlns="" xmlns:p14="http://schemas.microsoft.com/office/powerpoint/2010/main" val="2912836156"/>
       </p:ext>
     </p:extLst>
   </p:cSld>
@@ -4270,14 +4270,14 @@
           <a:noFill/>
           <a:extLst>
             <a:ext uri="{909E8E84-426E-40DD-AFC4-6F175D3DCCD1}">
-              <a14:hiddenFill xmlns:a14="http://schemas.microsoft.com/office/drawing/2010/main" xmlns="">
+              <a14:hiddenFill xmlns="" xmlns:a14="http://schemas.microsoft.com/office/drawing/2010/main">
                 <a:solidFill>
                   <a:srgbClr val="FFFFFF"/>
                 </a:solidFill>
               </a14:hiddenFill>
             </a:ext>
             <a:ext uri="{91240B29-F687-4F45-9708-019B960494DF}">
-              <a14:hiddenLine xmlns:a14="http://schemas.microsoft.com/office/drawing/2010/main" xmlns="" w="9525">
+              <a14:hiddenLine xmlns="" xmlns:a14="http://schemas.microsoft.com/office/drawing/2010/main" w="9525">
                 <a:solidFill>
                   <a:srgbClr val="000000"/>
                 </a:solidFill>
@@ -5181,79 +5181,63 @@
                 <a:ea typeface="Tahoma" pitchFamily="34" charset="0"/>
                 <a:cs typeface="Tahoma" pitchFamily="34" charset="0"/>
               </a:rPr>
+              <a:t> no </a:t>
+            </a:r>
+            <a:r>
+              <a:rPr lang="en-US" sz="8000" b="1" kern="0" dirty="0" smtClean="0">
+                <a:latin typeface="Tahoma" pitchFamily="34" charset="0"/>
+                <a:ea typeface="Tahoma" pitchFamily="34" charset="0"/>
+                <a:cs typeface="Tahoma" pitchFamily="34" charset="0"/>
+              </a:rPr>
+              <a:t>switch</a:t>
+            </a:r>
+            <a:r>
+              <a:rPr lang="en-US" sz="8000" kern="0" dirty="0" smtClean="0">
+                <a:latin typeface="Tahoma" pitchFamily="34" charset="0"/>
+                <a:ea typeface="Tahoma" pitchFamily="34" charset="0"/>
+                <a:cs typeface="Tahoma" pitchFamily="34" charset="0"/>
+              </a:rPr>
+              <a:t>: o PoE Budget, </a:t>
+            </a:r>
+            <a:r>
+              <a:rPr lang="en-US" sz="8000" kern="0" dirty="0" err="1" smtClean="0">
+                <a:latin typeface="Tahoma" pitchFamily="34" charset="0"/>
+                <a:ea typeface="Tahoma" pitchFamily="34" charset="0"/>
+                <a:cs typeface="Tahoma" pitchFamily="34" charset="0"/>
+              </a:rPr>
+              <a:t>somando</a:t>
+            </a:r>
+            <a:r>
+              <a:rPr lang="en-US" sz="8000" kern="0" dirty="0" smtClean="0">
+                <a:latin typeface="Tahoma" pitchFamily="34" charset="0"/>
+                <a:ea typeface="Tahoma" pitchFamily="34" charset="0"/>
+                <a:cs typeface="Tahoma" pitchFamily="34" charset="0"/>
+              </a:rPr>
+              <a:t>-se a </a:t>
+            </a:r>
+            <a:r>
+              <a:rPr lang="en-US" sz="8000" kern="0" dirty="0" err="1" smtClean="0">
+                <a:latin typeface="Tahoma" pitchFamily="34" charset="0"/>
+                <a:ea typeface="Tahoma" pitchFamily="34" charset="0"/>
+                <a:cs typeface="Tahoma" pitchFamily="34" charset="0"/>
+              </a:rPr>
+              <a:t>potência</a:t>
+            </a:r>
+            <a:r>
+              <a:rPr lang="en-US" sz="8000" kern="0" dirty="0" smtClean="0">
+                <a:latin typeface="Tahoma" pitchFamily="34" charset="0"/>
+                <a:ea typeface="Tahoma" pitchFamily="34" charset="0"/>
+                <a:cs typeface="Tahoma" pitchFamily="34" charset="0"/>
+              </a:rPr>
               <a:t> </a:t>
             </a:r>
             <a:r>
-              <a:rPr lang="en-US" sz="8000" kern="0" dirty="0" smtClean="0">
-                <a:latin typeface="Tahoma" pitchFamily="34" charset="0"/>
-                <a:ea typeface="Tahoma" pitchFamily="34" charset="0"/>
-                <a:cs typeface="Tahoma" pitchFamily="34" charset="0"/>
-              </a:rPr>
-              <a:t>no </a:t>
-            </a:r>
-            <a:r>
-              <a:rPr lang="en-US" sz="8000" b="1" kern="0" dirty="0" smtClean="0">
-                <a:latin typeface="Tahoma" pitchFamily="34" charset="0"/>
-                <a:ea typeface="Tahoma" pitchFamily="34" charset="0"/>
-                <a:cs typeface="Tahoma" pitchFamily="34" charset="0"/>
-              </a:rPr>
-              <a:t>switch</a:t>
-            </a:r>
-            <a:r>
-              <a:rPr lang="en-US" sz="8000" kern="0" dirty="0" smtClean="0">
-                <a:latin typeface="Tahoma" pitchFamily="34" charset="0"/>
-                <a:ea typeface="Tahoma" pitchFamily="34" charset="0"/>
-                <a:cs typeface="Tahoma" pitchFamily="34" charset="0"/>
-              </a:rPr>
-              <a:t>: o PoE Budget, </a:t>
-            </a:r>
-            <a:r>
               <a:rPr lang="en-US" sz="8000" kern="0" dirty="0" err="1" smtClean="0">
                 <a:latin typeface="Tahoma" pitchFamily="34" charset="0"/>
                 <a:ea typeface="Tahoma" pitchFamily="34" charset="0"/>
                 <a:cs typeface="Tahoma" pitchFamily="34" charset="0"/>
               </a:rPr>
-              <a:t>somando</a:t>
-            </a:r>
-            <a:r>
-              <a:rPr lang="en-US" sz="8000" kern="0" dirty="0" smtClean="0">
-                <a:latin typeface="Tahoma" pitchFamily="34" charset="0"/>
-                <a:ea typeface="Tahoma" pitchFamily="34" charset="0"/>
-                <a:cs typeface="Tahoma" pitchFamily="34" charset="0"/>
-              </a:rPr>
-              <a:t>-se a </a:t>
-            </a:r>
-            <a:r>
-              <a:rPr lang="en-US" sz="8000" kern="0" dirty="0" err="1" smtClean="0">
-                <a:latin typeface="Tahoma" pitchFamily="34" charset="0"/>
-                <a:ea typeface="Tahoma" pitchFamily="34" charset="0"/>
-                <a:cs typeface="Tahoma" pitchFamily="34" charset="0"/>
-              </a:rPr>
-              <a:t>potência</a:t>
-            </a:r>
-            <a:r>
-              <a:rPr lang="en-US" sz="8000" kern="0" dirty="0" smtClean="0">
-                <a:latin typeface="Tahoma" pitchFamily="34" charset="0"/>
-                <a:ea typeface="Tahoma" pitchFamily="34" charset="0"/>
-                <a:cs typeface="Tahoma" pitchFamily="34" charset="0"/>
-              </a:rPr>
-              <a:t> </a:t>
-            </a:r>
-            <a:r>
-              <a:rPr lang="en-US" sz="8000" kern="0" dirty="0" err="1" smtClean="0">
-                <a:latin typeface="Tahoma" pitchFamily="34" charset="0"/>
-                <a:ea typeface="Tahoma" pitchFamily="34" charset="0"/>
-                <a:cs typeface="Tahoma" pitchFamily="34" charset="0"/>
-              </a:rPr>
-              <a:t>c</a:t>
-            </a:r>
-            <a:r>
-              <a:rPr lang="en-US" sz="8000" kern="0" dirty="0" err="1" smtClean="0">
-                <a:latin typeface="Tahoma" pitchFamily="34" charset="0"/>
-                <a:ea typeface="Tahoma" pitchFamily="34" charset="0"/>
-                <a:cs typeface="Tahoma" pitchFamily="34" charset="0"/>
-              </a:rPr>
-              <a:t>onsumida</a:t>
+              <a:t>consumida</a:t>
             </a:r>
             <a:r>
               <a:rPr lang="en-US" sz="8000" kern="0" dirty="0" smtClean="0">
@@ -5392,15 +5376,7 @@
                 <a:ea typeface="Tahoma" pitchFamily="34" charset="0"/>
                 <a:cs typeface="Tahoma" pitchFamily="34" charset="0"/>
               </a:rPr>
-              <a:t> </a:t>
-            </a:r>
-            <a:r>
-              <a:rPr lang="en-US" sz="8000" kern="0" dirty="0" smtClean="0">
-                <a:latin typeface="Tahoma" pitchFamily="34" charset="0"/>
-                <a:ea typeface="Tahoma" pitchFamily="34" charset="0"/>
-                <a:cs typeface="Tahoma" pitchFamily="34" charset="0"/>
-              </a:rPr>
-              <a:t>de </a:t>
+              <a:t> de </a:t>
             </a:r>
             <a:r>
               <a:rPr lang="en-US" sz="8000" kern="0" dirty="0" err="1" smtClean="0">
@@ -5800,7 +5776,15 @@
                 <a:ea typeface="Tahoma" pitchFamily="34" charset="0"/>
                 <a:cs typeface="Tahoma" pitchFamily="34" charset="0"/>
               </a:rPr>
-              <a:t>v</a:t>
+              <a:t>ver</a:t>
+            </a:r>
+            <a:r>
+              <a:rPr lang="en-US" sz="8000" kern="0" dirty="0" smtClean="0">
+                <a:latin typeface="Tahoma" pitchFamily="34" charset="0"/>
+                <a:ea typeface="Tahoma" pitchFamily="34" charset="0"/>
+                <a:cs typeface="Tahoma" pitchFamily="34" charset="0"/>
+              </a:rPr>
+              <a:t> </a:t>
             </a:r>
             <a:r>
               <a:rPr lang="en-US" sz="8000" kern="0" dirty="0" err="1" smtClean="0">
@@ -5808,7 +5792,7 @@
                 <a:ea typeface="Tahoma" pitchFamily="34" charset="0"/>
                 <a:cs typeface="Tahoma" pitchFamily="34" charset="0"/>
               </a:rPr>
-              <a:t>er</a:t>
+              <a:t>em</a:t>
             </a:r>
             <a:r>
               <a:rPr lang="en-US" sz="8000" kern="0" dirty="0" smtClean="0">
@@ -5816,39 +5800,7 @@
                 <a:ea typeface="Tahoma" pitchFamily="34" charset="0"/>
                 <a:cs typeface="Tahoma" pitchFamily="34" charset="0"/>
               </a:rPr>
-              <a:t> </a:t>
-            </a:r>
-            <a:r>
-              <a:rPr lang="en-US" sz="8000" kern="0" dirty="0" err="1" smtClean="0">
-                <a:latin typeface="Tahoma" pitchFamily="34" charset="0"/>
-                <a:ea typeface="Tahoma" pitchFamily="34" charset="0"/>
-                <a:cs typeface="Tahoma" pitchFamily="34" charset="0"/>
-              </a:rPr>
-              <a:t>em</a:t>
-            </a:r>
-            <a:r>
-              <a:rPr lang="en-US" sz="8000" kern="0" dirty="0" smtClean="0">
-                <a:latin typeface="Tahoma" pitchFamily="34" charset="0"/>
-                <a:ea typeface="Tahoma" pitchFamily="34" charset="0"/>
-                <a:cs typeface="Tahoma" pitchFamily="34" charset="0"/>
-              </a:rPr>
-              <a:t> </a:t>
-            </a:r>
-            <a:r>
-              <a:rPr lang="en-US" sz="8000" kern="0" dirty="0" smtClean="0">
-                <a:latin typeface="Tahoma" pitchFamily="34" charset="0"/>
-                <a:ea typeface="Tahoma" pitchFamily="34" charset="0"/>
-                <a:cs typeface="Tahoma" pitchFamily="34" charset="0"/>
-              </a:rPr>
-              <a:t>tempo </a:t>
-            </a:r>
-            <a:r>
-              <a:rPr lang="en-US" sz="8000" kern="0" dirty="0" smtClean="0">
-                <a:latin typeface="Tahoma" pitchFamily="34" charset="0"/>
-                <a:ea typeface="Tahoma" pitchFamily="34" charset="0"/>
-                <a:cs typeface="Tahoma" pitchFamily="34" charset="0"/>
-              </a:rPr>
-              <a:t>real o </a:t>
+              <a:t> tempo real o </a:t>
             </a:r>
             <a:r>
               <a:rPr lang="en-US" sz="8000" kern="0" dirty="0" err="1" smtClean="0">
@@ -6030,7 +5982,7 @@
     </p:spTree>
     <p:extLst>
       <p:ext uri="{BB962C8B-B14F-4D97-AF65-F5344CB8AC3E}">
-        <p14:creationId xmlns:p14="http://schemas.microsoft.com/office/powerpoint/2010/main" xmlns="" val="1917671792"/>
+        <p14:creationId xmlns="" xmlns:p14="http://schemas.microsoft.com/office/powerpoint/2010/main" val="1917671792"/>
       </p:ext>
     </p:extLst>
   </p:cSld>
@@ -6610,7 +6562,7 @@
     </p:spTree>
     <p:extLst>
       <p:ext uri="{BB962C8B-B14F-4D97-AF65-F5344CB8AC3E}">
-        <p14:creationId xmlns:p14="http://schemas.microsoft.com/office/powerpoint/2010/main" xmlns="" val="3124170257"/>
+        <p14:creationId xmlns="" xmlns:p14="http://schemas.microsoft.com/office/powerpoint/2010/main" val="3124170257"/>
       </p:ext>
     </p:extLst>
   </p:cSld>
@@ -6873,15 +6825,7 @@
                 <a:ea typeface="Tahoma" pitchFamily="34" charset="0"/>
                 <a:cs typeface="Tahoma" pitchFamily="34" charset="0"/>
               </a:rPr>
-              <a:t> </a:t>
-            </a:r>
-            <a:r>
-              <a:rPr lang="en-US" sz="8000" dirty="0" smtClean="0">
-                <a:latin typeface="Tahoma" pitchFamily="34" charset="0"/>
-                <a:ea typeface="Tahoma" pitchFamily="34" charset="0"/>
-                <a:cs typeface="Tahoma" pitchFamily="34" charset="0"/>
-              </a:rPr>
-              <a:t>web </a:t>
+              <a:t> web </a:t>
             </a:r>
             <a:r>
               <a:rPr lang="en-US" sz="8000" dirty="0" err="1" smtClean="0">
@@ -7500,7 +7444,7 @@
     </p:spTree>
     <p:extLst>
       <p:ext uri="{BB962C8B-B14F-4D97-AF65-F5344CB8AC3E}">
-        <p14:creationId xmlns:p14="http://schemas.microsoft.com/office/powerpoint/2010/main" xmlns="" val="3124170257"/>
+        <p14:creationId xmlns="" xmlns:p14="http://schemas.microsoft.com/office/powerpoint/2010/main" val="3124170257"/>
       </p:ext>
     </p:extLst>
   </p:cSld>
@@ -7646,7 +7590,7 @@
     </p:spTree>
     <p:extLst>
       <p:ext uri="{BB962C8B-B14F-4D97-AF65-F5344CB8AC3E}">
-        <p14:creationId xmlns:p14="http://schemas.microsoft.com/office/powerpoint/2010/main" xmlns="" val="3799012556"/>
+        <p14:creationId xmlns="" xmlns:p14="http://schemas.microsoft.com/office/powerpoint/2010/main" val="3799012556"/>
       </p:ext>
     </p:extLst>
   </p:cSld>
@@ -7838,7 +7782,7 @@
     </p:spTree>
     <p:extLst>
       <p:ext uri="{BB962C8B-B14F-4D97-AF65-F5344CB8AC3E}">
-        <p14:creationId xmlns:p14="http://schemas.microsoft.com/office/powerpoint/2010/main" xmlns="" val="2028013524"/>
+        <p14:creationId xmlns="" xmlns:p14="http://schemas.microsoft.com/office/powerpoint/2010/main" val="2028013524"/>
       </p:ext>
     </p:extLst>
   </p:cSld>
@@ -7983,7 +7927,7 @@
     </p:spTree>
     <p:extLst>
       <p:ext uri="{BB962C8B-B14F-4D97-AF65-F5344CB8AC3E}">
-        <p14:creationId xmlns:p14="http://schemas.microsoft.com/office/powerpoint/2010/main" xmlns="" val="396538124"/>
+        <p14:creationId xmlns="" xmlns:p14="http://schemas.microsoft.com/office/powerpoint/2010/main" val="396538124"/>
       </p:ext>
     </p:extLst>
   </p:cSld>
@@ -8027,14 +7971,14 @@
             <p:ph idx="1"/>
             <p:extLst>
               <p:ext uri="{D42A27DB-BD31-4B8C-83A1-F6EECF244321}">
-                <p14:modId xmlns:p14="http://schemas.microsoft.com/office/powerpoint/2010/main" xmlns="" val="1360762172"/>
+                <p14:modId xmlns="" xmlns:p14="http://schemas.microsoft.com/office/powerpoint/2010/main" val="1360762172"/>
               </p:ext>
             </p:extLst>
           </p:nvPr>
         </p:nvGraphicFramePr>
         <p:xfrm>
-          <a:off x="533400" y="3429000"/>
-          <a:ext cx="11277601" cy="2520316"/>
+          <a:off x="838200" y="3733800"/>
+          <a:ext cx="10896601" cy="2479134"/>
         </p:xfrm>
         <a:graphic>
           <a:graphicData uri="http://schemas.openxmlformats.org/drawingml/2006/table">
@@ -8043,13 +7987,13 @@
                 <a:tableStyleId>{21E4AEA4-8DFA-4A89-87EB-49C32662AFE0}</a:tableStyleId>
               </a:tblPr>
               <a:tblGrid>
-                <a:gridCol w="1066799"/>
-                <a:gridCol w="2133600"/>
-                <a:gridCol w="1447800"/>
-                <a:gridCol w="3276600"/>
-                <a:gridCol w="3352802"/>
+                <a:gridCol w="1030758"/>
+                <a:gridCol w="2061519"/>
+                <a:gridCol w="1098723"/>
+                <a:gridCol w="3466069"/>
+                <a:gridCol w="3239532"/>
               </a:tblGrid>
-              <a:tr h="562597">
+              <a:tr h="545587">
                 <a:tc>
                   <a:txBody>
                     <a:bodyPr/>
@@ -8230,7 +8174,7 @@
                   <a:tcPr anchor="ctr"/>
                 </a:tc>
               </a:tr>
-              <a:tr h="573028">
+              <a:tr h="561611">
                 <a:tc>
                   <a:txBody>
                     <a:bodyPr/>
@@ -8323,15 +8267,7 @@
                           <a:ea typeface="Tahoma" pitchFamily="34" charset="0"/>
                           <a:cs typeface="Tahoma" pitchFamily="34" charset="0"/>
                         </a:rPr>
-                        <a:t> 7.5V, 9V, </a:t>
-                      </a:r>
-                      <a:r>
-                        <a:rPr lang="en-US" sz="1600" b="0" baseline="0" dirty="0" smtClean="0">
-                          <a:latin typeface="Tahoma" pitchFamily="34" charset="0"/>
-                          <a:ea typeface="Tahoma" pitchFamily="34" charset="0"/>
-                          <a:cs typeface="Tahoma" pitchFamily="34" charset="0"/>
-                        </a:rPr>
-                        <a:t>12V @ 15,4 W</a:t>
+                        <a:t> 7.5V, 9V, 12V @ 15,4 W</a:t>
                       </a:r>
                       <a:endParaRPr lang="en-US" sz="1600" b="0" dirty="0">
                         <a:latin typeface="Tahoma" pitchFamily="34" charset="0"/>
@@ -8366,7 +8302,7 @@
                   <a:tcPr anchor="ctr"/>
                 </a:tc>
               </a:tr>
-              <a:tr h="799479">
+              <a:tr h="775307">
                 <a:tc>
                   <a:txBody>
                     <a:bodyPr/>
@@ -8485,35 +8421,14 @@
                           <a:ea typeface="Tahoma" pitchFamily="34" charset="0"/>
                           <a:cs typeface="Tahoma" pitchFamily="34" charset="0"/>
                         </a:rPr>
-                        <a:t>802.3af </a:t>
+                        <a:t>802.3af (mode A)</a:t>
                       </a:r>
-                      <a:r>
-                        <a:rPr lang="en-US" sz="1600" dirty="0" smtClean="0">
-                          <a:latin typeface="Tahoma" pitchFamily="34" charset="0"/>
-                          <a:ea typeface="Tahoma" pitchFamily="34" charset="0"/>
-                          <a:cs typeface="Tahoma" pitchFamily="34" charset="0"/>
-                        </a:rPr>
-                        <a:t>(mode A</a:t>
-                      </a:r>
-                      <a:r>
-                        <a:rPr lang="en-US" sz="1600" dirty="0" smtClean="0">
-                          <a:latin typeface="Tahoma" pitchFamily="34" charset="0"/>
-                          <a:ea typeface="Tahoma" pitchFamily="34" charset="0"/>
-                          <a:cs typeface="Tahoma" pitchFamily="34" charset="0"/>
-                        </a:rPr>
-                        <a:t>)</a:t>
-                      </a:r>
-                      <a:endParaRPr lang="en-US" sz="1600" dirty="0" smtClean="0">
-                        <a:latin typeface="Tahoma" pitchFamily="34" charset="0"/>
-                        <a:ea typeface="Tahoma" pitchFamily="34" charset="0"/>
-                        <a:cs typeface="Tahoma" pitchFamily="34" charset="0"/>
-                      </a:endParaRPr>
                     </a:p>
                   </a:txBody>
                   <a:tcPr anchor="ctr"/>
                 </a:tc>
               </a:tr>
-              <a:tr h="573028">
+              <a:tr h="561611">
                 <a:tc>
                   <a:txBody>
                     <a:bodyPr/>
@@ -8643,29 +8558,8 @@
                           <a:ea typeface="Tahoma" pitchFamily="34" charset="0"/>
                           <a:cs typeface="Tahoma" pitchFamily="34" charset="0"/>
                         </a:rPr>
-                        <a:t>802.3at </a:t>
+                        <a:t>802.3at (mode A)</a:t>
                       </a:r>
-                      <a:r>
-                        <a:rPr lang="en-US" sz="1600" dirty="0" smtClean="0">
-                          <a:latin typeface="Tahoma" pitchFamily="34" charset="0"/>
-                          <a:ea typeface="Tahoma" pitchFamily="34" charset="0"/>
-                          <a:cs typeface="Tahoma" pitchFamily="34" charset="0"/>
-                        </a:rPr>
-                        <a:t>(mode A</a:t>
-                      </a:r>
-                      <a:r>
-                        <a:rPr lang="en-US" sz="1600" dirty="0" smtClean="0">
-                          <a:latin typeface="Tahoma" pitchFamily="34" charset="0"/>
-                          <a:ea typeface="Tahoma" pitchFamily="34" charset="0"/>
-                          <a:cs typeface="Tahoma" pitchFamily="34" charset="0"/>
-                        </a:rPr>
-                        <a:t>)</a:t>
-                      </a:r>
-                      <a:endParaRPr lang="en-US" sz="1600" dirty="0" smtClean="0">
-                        <a:latin typeface="Tahoma" pitchFamily="34" charset="0"/>
-                        <a:ea typeface="Tahoma" pitchFamily="34" charset="0"/>
-                        <a:cs typeface="Tahoma" pitchFamily="34" charset="0"/>
-                      </a:endParaRPr>
                     </a:p>
                   </a:txBody>
                   <a:tcPr anchor="ctr"/>
@@ -8692,7 +8586,7 @@
         </p:blipFill>
         <p:spPr bwMode="auto">
           <a:xfrm>
-            <a:off x="4114800" y="4054390"/>
+            <a:off x="4218461" y="4206790"/>
             <a:ext cx="505939" cy="505939"/>
           </a:xfrm>
           <a:prstGeom prst="rect">
@@ -8808,7 +8702,7 @@
         </p:blipFill>
         <p:spPr bwMode="auto">
           <a:xfrm>
-            <a:off x="4114800" y="4751861"/>
+            <a:off x="4218461" y="4904261"/>
             <a:ext cx="505939" cy="505939"/>
           </a:xfrm>
           <a:prstGeom prst="rect">
@@ -8840,7 +8734,7 @@
         </p:blipFill>
         <p:spPr bwMode="auto">
           <a:xfrm>
-            <a:off x="4114800" y="5361461"/>
+            <a:off x="4218461" y="5513861"/>
             <a:ext cx="505939" cy="505939"/>
           </a:xfrm>
           <a:prstGeom prst="rect">
@@ -8872,7 +8766,7 @@
         </p:blipFill>
         <p:spPr bwMode="auto">
           <a:xfrm>
-            <a:off x="727059" y="5399454"/>
+            <a:off x="1031859" y="5562600"/>
             <a:ext cx="755682" cy="476250"/>
           </a:xfrm>
           <a:prstGeom prst="rect">
@@ -8904,7 +8798,7 @@
         </p:blipFill>
         <p:spPr bwMode="auto">
           <a:xfrm>
-            <a:off x="685800" y="4630450"/>
+            <a:off x="990600" y="4800600"/>
             <a:ext cx="838200" cy="640976"/>
           </a:xfrm>
           <a:prstGeom prst="rect">
@@ -8936,7 +8830,7 @@
         </p:blipFill>
         <p:spPr bwMode="auto">
           <a:xfrm>
-            <a:off x="800100" y="4038600"/>
+            <a:off x="1104900" y="4191000"/>
             <a:ext cx="609600" cy="484554"/>
           </a:xfrm>
           <a:prstGeom prst="rect">
@@ -8962,7 +8856,7 @@
         <p:spPr bwMode="auto">
           <a:xfrm>
             <a:off x="762000" y="1447800"/>
-            <a:ext cx="10972800" cy="1828800"/>
+            <a:ext cx="10972800" cy="2133600"/>
           </a:xfrm>
           <a:prstGeom prst="rect">
             <a:avLst/>
@@ -9144,7 +9038,7 @@
                 <a:ea typeface="Tahoma" pitchFamily="34" charset="0"/>
                 <a:cs typeface="Tahoma" pitchFamily="34" charset="0"/>
               </a:rPr>
-              <a:t>Na falta de um switch PoE, utiliza-se um injetor que recebe uma porta </a:t>
+              <a:t>Para se conectar uma única porta PoE, em vez do switch PoE, pode-se usar um </a:t>
             </a:r>
             <a:r>
               <a:rPr lang="pt-BR" sz="8000" kern="0" dirty="0" smtClean="0">
@@ -9152,6 +9046,62 @@
                 <a:ea typeface="Tahoma" pitchFamily="34" charset="0"/>
                 <a:cs typeface="Tahoma" pitchFamily="34" charset="0"/>
               </a:rPr>
+              <a:t>injetor </a:t>
+            </a:r>
+            <a:r>
+              <a:rPr lang="pt-BR" sz="8000" kern="0" dirty="0" smtClean="0">
+                <a:latin typeface="Tahoma" pitchFamily="34" charset="0"/>
+                <a:ea typeface="Tahoma" pitchFamily="34" charset="0"/>
+                <a:cs typeface="Tahoma" pitchFamily="34" charset="0"/>
+              </a:rPr>
+              <a:t>PoE que possui uma </a:t>
+            </a:r>
+            <a:r>
+              <a:rPr lang="pt-BR" sz="8000" kern="0" dirty="0" smtClean="0">
+                <a:latin typeface="Tahoma" pitchFamily="34" charset="0"/>
+                <a:ea typeface="Tahoma" pitchFamily="34" charset="0"/>
+                <a:cs typeface="Tahoma" pitchFamily="34" charset="0"/>
+              </a:rPr>
+              <a:t>porta Ethernet de </a:t>
+            </a:r>
+            <a:r>
+              <a:rPr lang="pt-BR" sz="8000" kern="0" dirty="0" smtClean="0">
+                <a:latin typeface="Tahoma" pitchFamily="34" charset="0"/>
+                <a:ea typeface="Tahoma" pitchFamily="34" charset="0"/>
+                <a:cs typeface="Tahoma" pitchFamily="34" charset="0"/>
+              </a:rPr>
+              <a:t>entrada e alimentação </a:t>
+            </a:r>
+            <a:r>
+              <a:rPr lang="pt-BR" sz="8000" kern="0" dirty="0" smtClean="0">
+                <a:latin typeface="Tahoma" pitchFamily="34" charset="0"/>
+                <a:ea typeface="Tahoma" pitchFamily="34" charset="0"/>
+                <a:cs typeface="Tahoma" pitchFamily="34" charset="0"/>
+              </a:rPr>
+              <a:t>externa. </a:t>
+            </a:r>
+            <a:r>
+              <a:rPr lang="pt-BR" sz="8000" kern="0" dirty="0" smtClean="0">
+                <a:latin typeface="Tahoma" pitchFamily="34" charset="0"/>
+                <a:ea typeface="Tahoma" pitchFamily="34" charset="0"/>
+                <a:cs typeface="Tahoma" pitchFamily="34" charset="0"/>
+              </a:rPr>
+              <a:t>A </a:t>
+            </a:r>
+            <a:r>
+              <a:rPr lang="pt-BR" sz="8000" kern="0" dirty="0" smtClean="0">
+                <a:latin typeface="Tahoma" pitchFamily="34" charset="0"/>
+                <a:ea typeface="Tahoma" pitchFamily="34" charset="0"/>
+                <a:cs typeface="Tahoma" pitchFamily="34" charset="0"/>
+              </a:rPr>
+              <a:t>saída </a:t>
+            </a:r>
+            <a:r>
+              <a:rPr lang="pt-BR" sz="8000" kern="0" dirty="0" smtClean="0">
+                <a:latin typeface="Tahoma" pitchFamily="34" charset="0"/>
+                <a:ea typeface="Tahoma" pitchFamily="34" charset="0"/>
+                <a:cs typeface="Tahoma" pitchFamily="34" charset="0"/>
+              </a:rPr>
               <a:t>Ethernet </a:t>
             </a:r>
             <a:r>
@@ -9160,8 +9110,53 @@
                 <a:ea typeface="Tahoma" pitchFamily="34" charset="0"/>
                 <a:cs typeface="Tahoma" pitchFamily="34" charset="0"/>
               </a:rPr>
-              <a:t>de dados, além de alimentação externa. A saída é uma porta Ethernet PoE (ou PoE+) com energia e dados.</a:t>
-            </a:r>
+              <a:t>PoE (ou PoE+) </a:t>
+            </a:r>
+            <a:r>
+              <a:rPr lang="pt-BR" sz="8000" kern="0" dirty="0" smtClean="0">
+                <a:latin typeface="Tahoma" pitchFamily="34" charset="0"/>
+                <a:ea typeface="Tahoma" pitchFamily="34" charset="0"/>
+                <a:cs typeface="Tahoma" pitchFamily="34" charset="0"/>
+              </a:rPr>
+              <a:t>é quem </a:t>
+            </a:r>
+            <a:r>
+              <a:rPr lang="pt-BR" sz="8000" kern="0" dirty="0" smtClean="0">
+                <a:latin typeface="Tahoma" pitchFamily="34" charset="0"/>
+                <a:ea typeface="Tahoma" pitchFamily="34" charset="0"/>
+                <a:cs typeface="Tahoma" pitchFamily="34" charset="0"/>
+              </a:rPr>
+              <a:t>fornece </a:t>
+            </a:r>
+            <a:r>
+              <a:rPr lang="pt-BR" sz="8000" kern="0" dirty="0" smtClean="0">
+                <a:latin typeface="Tahoma" pitchFamily="34" charset="0"/>
+                <a:ea typeface="Tahoma" pitchFamily="34" charset="0"/>
+                <a:cs typeface="Tahoma" pitchFamily="34" charset="0"/>
+              </a:rPr>
+              <a:t>energia </a:t>
+            </a:r>
+            <a:r>
+              <a:rPr lang="pt-BR" sz="8000" kern="0" dirty="0" smtClean="0">
+                <a:latin typeface="Tahoma" pitchFamily="34" charset="0"/>
+                <a:ea typeface="Tahoma" pitchFamily="34" charset="0"/>
+                <a:cs typeface="Tahoma" pitchFamily="34" charset="0"/>
+              </a:rPr>
+              <a:t>e </a:t>
+            </a:r>
+            <a:r>
+              <a:rPr lang="pt-BR" sz="8000" kern="0" dirty="0" smtClean="0">
+                <a:latin typeface="Tahoma" pitchFamily="34" charset="0"/>
+                <a:ea typeface="Tahoma" pitchFamily="34" charset="0"/>
+                <a:cs typeface="Tahoma" pitchFamily="34" charset="0"/>
+              </a:rPr>
+              <a:t>dados simultaneamente para o dispositivo PoE conectado.</a:t>
+            </a:r>
+            <a:endParaRPr lang="pt-BR" sz="8000" kern="0" dirty="0" smtClean="0">
+              <a:latin typeface="Tahoma" pitchFamily="34" charset="0"/>
+              <a:ea typeface="Tahoma" pitchFamily="34" charset="0"/>
+              <a:cs typeface="Tahoma" pitchFamily="34" charset="0"/>
+            </a:endParaRPr>
           </a:p>
           <a:p>
             <a:pPr lvl="0" eaLnBrk="0" fontAlgn="base" hangingPunct="0">
@@ -9194,7 +9189,7 @@
                 <a:ea typeface="Tahoma" pitchFamily="34" charset="0"/>
                 <a:cs typeface="Tahoma" pitchFamily="34" charset="0"/>
               </a:rPr>
-              <a:t> é utilizado para alimentar dispositivos comuns, sem PoE. Possui uma porta de entrada </a:t>
+              <a:t> é utilizado para alimentar dispositivos comuns, </a:t>
             </a:r>
             <a:r>
               <a:rPr lang="pt-BR" sz="8000" kern="0" dirty="0" smtClean="0">
@@ -9202,7 +9197,7 @@
                 <a:ea typeface="Tahoma" pitchFamily="34" charset="0"/>
                 <a:cs typeface="Tahoma" pitchFamily="34" charset="0"/>
               </a:rPr>
-              <a:t>PoE </a:t>
+              <a:t>não </a:t>
             </a:r>
             <a:r>
               <a:rPr lang="pt-BR" sz="8000" kern="0" dirty="0" smtClean="0">
@@ -9210,7 +9205,47 @@
                 <a:ea typeface="Tahoma" pitchFamily="34" charset="0"/>
                 <a:cs typeface="Tahoma" pitchFamily="34" charset="0"/>
               </a:rPr>
-              <a:t>energizada e saídas de fonte de alimentação, além de uma porta Ethernet só para dados.</a:t>
+              <a:t>PoE. </a:t>
+            </a:r>
+            <a:r>
+              <a:rPr lang="pt-BR" sz="8000" kern="0" dirty="0" smtClean="0">
+                <a:latin typeface="Tahoma" pitchFamily="34" charset="0"/>
+                <a:ea typeface="Tahoma" pitchFamily="34" charset="0"/>
+                <a:cs typeface="Tahoma" pitchFamily="34" charset="0"/>
+              </a:rPr>
+              <a:t>A entrada é padrão Ethernet </a:t>
+            </a:r>
+            <a:r>
+              <a:rPr lang="pt-BR" sz="8000" kern="0" smtClean="0">
+                <a:latin typeface="Tahoma" pitchFamily="34" charset="0"/>
+                <a:ea typeface="Tahoma" pitchFamily="34" charset="0"/>
+                <a:cs typeface="Tahoma" pitchFamily="34" charset="0"/>
+              </a:rPr>
+              <a:t>PoE que alimenta </a:t>
+            </a:r>
+            <a:r>
+              <a:rPr lang="pt-BR" sz="8000" kern="0" dirty="0" smtClean="0">
+                <a:latin typeface="Tahoma" pitchFamily="34" charset="0"/>
+                <a:ea typeface="Tahoma" pitchFamily="34" charset="0"/>
+                <a:cs typeface="Tahoma" pitchFamily="34" charset="0"/>
+              </a:rPr>
+              <a:t>saídas com voltagens variadas, </a:t>
+            </a:r>
+            <a:r>
+              <a:rPr lang="pt-BR" sz="8000" kern="0" dirty="0" smtClean="0">
+                <a:latin typeface="Tahoma" pitchFamily="34" charset="0"/>
+                <a:ea typeface="Tahoma" pitchFamily="34" charset="0"/>
+                <a:cs typeface="Tahoma" pitchFamily="34" charset="0"/>
+              </a:rPr>
+              <a:t>além de uma porta </a:t>
+            </a:r>
+            <a:r>
+              <a:rPr lang="pt-BR" sz="8000" kern="0" dirty="0" smtClean="0">
+                <a:latin typeface="Tahoma" pitchFamily="34" charset="0"/>
+                <a:ea typeface="Tahoma" pitchFamily="34" charset="0"/>
+                <a:cs typeface="Tahoma" pitchFamily="34" charset="0"/>
+              </a:rPr>
+              <a:t>Ethernet de dados.</a:t>
             </a:r>
             <a:endParaRPr kumimoji="0" lang="en-US" sz="2400" b="1" i="0" u="none" strike="noStrike" kern="0" cap="none" spc="0" normalizeH="0" baseline="0" noProof="0" dirty="0">
               <a:ln>
@@ -9232,7 +9267,7 @@
     </p:spTree>
     <p:extLst>
       <p:ext uri="{BB962C8B-B14F-4D97-AF65-F5344CB8AC3E}">
-        <p14:creationId xmlns:p14="http://schemas.microsoft.com/office/powerpoint/2010/main" xmlns="" val="3788721219"/>
+        <p14:creationId xmlns="" xmlns:p14="http://schemas.microsoft.com/office/powerpoint/2010/main" val="3788721219"/>
       </p:ext>
     </p:extLst>
   </p:cSld>
@@ -9319,11 +9354,6 @@
               </a:rPr>
               <a:t> Gigabit PoE+</a:t>
             </a:r>
-            <a:endParaRPr lang="en-US" sz="9600" b="1" dirty="0" smtClean="0">
-              <a:latin typeface="Tahoma" pitchFamily="34" charset="0"/>
-              <a:ea typeface="Tahoma" pitchFamily="34" charset="0"/>
-              <a:cs typeface="Tahoma" pitchFamily="34" charset="0"/>
-            </a:endParaRPr>
           </a:p>
           <a:p>
             <a:pPr marL="0" indent="0">
@@ -9335,63 +9365,7 @@
                 <a:ea typeface="Tahoma" pitchFamily="34" charset="0"/>
                 <a:cs typeface="Tahoma" pitchFamily="34" charset="0"/>
               </a:rPr>
-              <a:t>O </a:t>
-            </a:r>
-            <a:r>
-              <a:rPr lang="pt-BR" sz="8000" dirty="0" smtClean="0">
-                <a:latin typeface="Tahoma" pitchFamily="34" charset="0"/>
-                <a:ea typeface="Tahoma" pitchFamily="34" charset="0"/>
-                <a:cs typeface="Tahoma" pitchFamily="34" charset="0"/>
-              </a:rPr>
-              <a:t>Repetidores TRENDnet PoE+ </a:t>
-            </a:r>
-            <a:r>
-              <a:rPr lang="pt-BR" sz="8000" dirty="0" smtClean="0">
-                <a:latin typeface="Tahoma" pitchFamily="34" charset="0"/>
-                <a:ea typeface="Tahoma" pitchFamily="34" charset="0"/>
-                <a:cs typeface="Tahoma" pitchFamily="34" charset="0"/>
-              </a:rPr>
-              <a:t>detectam PoE ou PoE+ e </a:t>
-            </a:r>
-            <a:r>
-              <a:rPr lang="pt-BR" sz="8000" dirty="0" smtClean="0">
-                <a:latin typeface="Tahoma" pitchFamily="34" charset="0"/>
-                <a:ea typeface="Tahoma" pitchFamily="34" charset="0"/>
-                <a:cs typeface="Tahoma" pitchFamily="34" charset="0"/>
-              </a:rPr>
-              <a:t>prolongam a </a:t>
-            </a:r>
-            <a:r>
-              <a:rPr lang="pt-BR" sz="8000" dirty="0" smtClean="0">
-                <a:latin typeface="Tahoma" pitchFamily="34" charset="0"/>
-                <a:ea typeface="Tahoma" pitchFamily="34" charset="0"/>
-                <a:cs typeface="Tahoma" pitchFamily="34" charset="0"/>
-              </a:rPr>
-              <a:t>rede </a:t>
-            </a:r>
-            <a:r>
-              <a:rPr lang="pt-BR" sz="8000" dirty="0" smtClean="0">
-                <a:latin typeface="Tahoma" pitchFamily="34" charset="0"/>
-                <a:ea typeface="Tahoma" pitchFamily="34" charset="0"/>
-                <a:cs typeface="Tahoma" pitchFamily="34" charset="0"/>
-              </a:rPr>
-              <a:t>Gigabit, permitindo a utilização de cabos de par trançado com até </a:t>
-            </a:r>
-            <a:r>
-              <a:rPr lang="pt-BR" sz="8000" dirty="0" smtClean="0">
-                <a:latin typeface="Tahoma" pitchFamily="34" charset="0"/>
-                <a:ea typeface="Tahoma" pitchFamily="34" charset="0"/>
-                <a:cs typeface="Tahoma" pitchFamily="34" charset="0"/>
-              </a:rPr>
-              <a:t>200 </a:t>
-            </a:r>
-            <a:r>
-              <a:rPr lang="pt-BR" sz="8000" dirty="0" smtClean="0">
-                <a:latin typeface="Tahoma" pitchFamily="34" charset="0"/>
-                <a:ea typeface="Tahoma" pitchFamily="34" charset="0"/>
-                <a:cs typeface="Tahoma" pitchFamily="34" charset="0"/>
-              </a:rPr>
-              <a:t>m de comprimento.</a:t>
+              <a:t>O Repetidores TRENDnet PoE+ detectam PoE ou PoE+ e prolongam a rede Gigabit, permitindo a utilização de cabos de par trançado com até 200 m de comprimento.</a:t>
             </a:r>
           </a:p>
           <a:p>
@@ -9414,39 +9388,7 @@
                 <a:ea typeface="Tahoma" pitchFamily="34" charset="0"/>
                 <a:cs typeface="Tahoma" pitchFamily="34" charset="0"/>
               </a:rPr>
-              <a:t>Interligando dois </a:t>
-            </a:r>
-            <a:r>
-              <a:rPr lang="pt-BR" sz="8000" dirty="0" smtClean="0">
-                <a:latin typeface="Tahoma" pitchFamily="34" charset="0"/>
-                <a:ea typeface="Tahoma" pitchFamily="34" charset="0"/>
-                <a:cs typeface="Tahoma" pitchFamily="34" charset="0"/>
-              </a:rPr>
-              <a:t>TPE-E100 </a:t>
-            </a:r>
-            <a:r>
-              <a:rPr lang="pt-BR" sz="8000" dirty="0" smtClean="0">
-                <a:latin typeface="Tahoma" pitchFamily="34" charset="0"/>
-                <a:ea typeface="Tahoma" pitchFamily="34" charset="0"/>
-                <a:cs typeface="Tahoma" pitchFamily="34" charset="0"/>
-              </a:rPr>
-              <a:t>em cascata é possível estender uma rede PoE+ para até 300 m. No caso do TPE-E110, até 7 unidades podem ser cascateadas, resultando em uma rede PoE+ distante até 800 m do dispositivo. Em ambos os casos, não há necessidade </a:t>
-            </a:r>
-            <a:r>
-              <a:rPr lang="pt-BR" sz="8000" dirty="0" smtClean="0">
-                <a:latin typeface="Tahoma" pitchFamily="34" charset="0"/>
-                <a:ea typeface="Tahoma" pitchFamily="34" charset="0"/>
-                <a:cs typeface="Tahoma" pitchFamily="34" charset="0"/>
-              </a:rPr>
-              <a:t>de </a:t>
-            </a:r>
-            <a:r>
-              <a:rPr lang="pt-BR" sz="8000" dirty="0" smtClean="0">
-                <a:latin typeface="Tahoma" pitchFamily="34" charset="0"/>
-                <a:ea typeface="Tahoma" pitchFamily="34" charset="0"/>
-                <a:cs typeface="Tahoma" pitchFamily="34" charset="0"/>
-              </a:rPr>
-              <a:t>se utilizar adaptadores externos de potência, facilitando a instalação.</a:t>
+              <a:t>Interligando dois TPE-E100 em cascata é possível estender uma rede PoE+ para até 300 m. No caso do TPE-E110, até 7 unidades podem ser cascateadas, resultando em uma rede PoE+ distante até 800 m do dispositivo. Em ambos os casos, não há necessidade de se utilizar adaptadores externos de potência, facilitando a instalação.</a:t>
             </a:r>
             <a:endParaRPr lang="en-US" sz="8000" b="1" dirty="0" smtClean="0">
               <a:latin typeface="Tahoma" pitchFamily="34" charset="0"/>
@@ -9791,7 +9733,7 @@
     </p:spTree>
     <p:extLst>
       <p:ext uri="{BB962C8B-B14F-4D97-AF65-F5344CB8AC3E}">
-        <p14:creationId xmlns:p14="http://schemas.microsoft.com/office/powerpoint/2010/main" xmlns="" val="4230980017"/>
+        <p14:creationId xmlns="" xmlns:p14="http://schemas.microsoft.com/office/powerpoint/2010/main" val="4230980017"/>
       </p:ext>
     </p:extLst>
   </p:cSld>
@@ -10869,7 +10811,7 @@
           <a:blip r:embed="rId3" cstate="print">
             <a:extLst>
               <a:ext uri="{28A0092B-C50C-407E-A947-70E740481C1C}">
-                <a14:useLocalDpi xmlns:a14="http://schemas.microsoft.com/office/drawing/2010/main" xmlns="" val="0"/>
+                <a14:useLocalDpi xmlns="" xmlns:a14="http://schemas.microsoft.com/office/drawing/2010/main" val="0"/>
               </a:ext>
             </a:extLst>
           </a:blip>
@@ -10893,14 +10835,14 @@
           <a:effectLst/>
           <a:extLst>
             <a:ext uri="{909E8E84-426E-40DD-AFC4-6F175D3DCCD1}">
-              <a14:hiddenFill xmlns:a14="http://schemas.microsoft.com/office/drawing/2010/main" xmlns="">
+              <a14:hiddenFill xmlns="" xmlns:a14="http://schemas.microsoft.com/office/drawing/2010/main">
                 <a:solidFill>
                   <a:schemeClr val="accent1"/>
                 </a:solidFill>
               </a14:hiddenFill>
             </a:ext>
             <a:ext uri="{91240B29-F687-4F45-9708-019B960494DF}">
-              <a14:hiddenLine xmlns:a14="http://schemas.microsoft.com/office/drawing/2010/main" xmlns="" w="9525">
+              <a14:hiddenLine xmlns="" xmlns:a14="http://schemas.microsoft.com/office/drawing/2010/main" w="9525">
                 <a:solidFill>
                   <a:schemeClr val="tx1"/>
                 </a:solidFill>
@@ -10910,7 +10852,7 @@
               </a14:hiddenLine>
             </a:ext>
             <a:ext uri="{AF507438-7753-43E0-B8FC-AC1667EBCBE1}">
-              <a14:hiddenEffects xmlns:a14="http://schemas.microsoft.com/office/drawing/2010/main" xmlns="">
+              <a14:hiddenEffects xmlns="" xmlns:a14="http://schemas.microsoft.com/office/drawing/2010/main">
                 <a:effectLst>
                   <a:outerShdw dist="35921" dir="2700000" algn="ctr" rotWithShape="0">
                     <a:schemeClr val="bg2"/>
@@ -11113,11 +11055,6 @@
               </a:rPr>
               <a:t> PoE</a:t>
             </a:r>
-            <a:endParaRPr lang="en-US" sz="2400" b="1" dirty="0" smtClean="0">
-              <a:latin typeface="Tahoma" pitchFamily="34" charset="0"/>
-              <a:ea typeface="Tahoma" pitchFamily="34" charset="0"/>
-              <a:cs typeface="Tahoma" pitchFamily="34" charset="0"/>
-            </a:endParaRPr>
           </a:p>
         </p:txBody>
       </p:sp>
@@ -11202,7 +11139,7 @@
     </p:spTree>
     <p:extLst>
       <p:ext uri="{BB962C8B-B14F-4D97-AF65-F5344CB8AC3E}">
-        <p14:creationId xmlns:p14="http://schemas.microsoft.com/office/powerpoint/2010/main" xmlns="" val="2820830139"/>
+        <p14:creationId xmlns="" xmlns:p14="http://schemas.microsoft.com/office/powerpoint/2010/main" val="2820830139"/>
       </p:ext>
     </p:extLst>
   </p:cSld>
@@ -12622,7 +12559,7 @@
             </a:clrChange>
             <a:extLst>
               <a:ext uri="{28A0092B-C50C-407E-A947-70E740481C1C}">
-                <a14:useLocalDpi xmlns:a14="http://schemas.microsoft.com/office/drawing/2010/main" xmlns="" val="0"/>
+                <a14:useLocalDpi xmlns="" xmlns:a14="http://schemas.microsoft.com/office/drawing/2010/main" val="0"/>
               </a:ext>
             </a:extLst>
           </a:blip>
@@ -12646,14 +12583,14 @@
           <a:effectLst/>
           <a:extLst>
             <a:ext uri="{909E8E84-426E-40DD-AFC4-6F175D3DCCD1}">
-              <a14:hiddenFill xmlns:a14="http://schemas.microsoft.com/office/drawing/2010/main" xmlns="">
+              <a14:hiddenFill xmlns="" xmlns:a14="http://schemas.microsoft.com/office/drawing/2010/main">
                 <a:solidFill>
                   <a:schemeClr val="accent1"/>
                 </a:solidFill>
               </a14:hiddenFill>
             </a:ext>
             <a:ext uri="{91240B29-F687-4F45-9708-019B960494DF}">
-              <a14:hiddenLine xmlns:a14="http://schemas.microsoft.com/office/drawing/2010/main" xmlns="" w="9525">
+              <a14:hiddenLine xmlns="" xmlns:a14="http://schemas.microsoft.com/office/drawing/2010/main" w="9525">
                 <a:solidFill>
                   <a:schemeClr val="tx1"/>
                 </a:solidFill>
@@ -12663,7 +12600,7 @@
               </a14:hiddenLine>
             </a:ext>
             <a:ext uri="{AF507438-7753-43E0-B8FC-AC1667EBCBE1}">
-              <a14:hiddenEffects xmlns:a14="http://schemas.microsoft.com/office/drawing/2010/main" xmlns="">
+              <a14:hiddenEffects xmlns="" xmlns:a14="http://schemas.microsoft.com/office/drawing/2010/main">
                 <a:effectLst>
                   <a:outerShdw dist="35921" dir="2700000" algn="ctr" rotWithShape="0">
                     <a:schemeClr val="bg2"/>
@@ -12686,7 +12623,7 @@
           <a:blip r:embed="rId5" cstate="print">
             <a:extLst>
               <a:ext uri="{28A0092B-C50C-407E-A947-70E740481C1C}">
-                <a14:useLocalDpi xmlns:a14="http://schemas.microsoft.com/office/drawing/2010/main" xmlns="" val="0"/>
+                <a14:useLocalDpi xmlns="" xmlns:a14="http://schemas.microsoft.com/office/drawing/2010/main" val="0"/>
               </a:ext>
             </a:extLst>
           </a:blip>
@@ -12710,14 +12647,14 @@
           <a:effectLst/>
           <a:extLst>
             <a:ext uri="{909E8E84-426E-40DD-AFC4-6F175D3DCCD1}">
-              <a14:hiddenFill xmlns:a14="http://schemas.microsoft.com/office/drawing/2010/main" xmlns="">
+              <a14:hiddenFill xmlns="" xmlns:a14="http://schemas.microsoft.com/office/drawing/2010/main">
                 <a:solidFill>
                   <a:schemeClr val="accent1"/>
                 </a:solidFill>
               </a14:hiddenFill>
             </a:ext>
             <a:ext uri="{91240B29-F687-4F45-9708-019B960494DF}">
-              <a14:hiddenLine xmlns:a14="http://schemas.microsoft.com/office/drawing/2010/main" xmlns="" w="9525">
+              <a14:hiddenLine xmlns="" xmlns:a14="http://schemas.microsoft.com/office/drawing/2010/main" w="9525">
                 <a:solidFill>
                   <a:schemeClr val="tx1"/>
                 </a:solidFill>
@@ -12727,7 +12664,7 @@
               </a14:hiddenLine>
             </a:ext>
             <a:ext uri="{AF507438-7753-43E0-B8FC-AC1667EBCBE1}">
-              <a14:hiddenEffects xmlns:a14="http://schemas.microsoft.com/office/drawing/2010/main" xmlns="">
+              <a14:hiddenEffects xmlns="" xmlns:a14="http://schemas.microsoft.com/office/drawing/2010/main">
                 <a:effectLst>
                   <a:outerShdw dist="35921" dir="2700000" algn="ctr" rotWithShape="0">
                     <a:schemeClr val="bg2"/>
@@ -12942,15 +12879,7 @@
                 <a:ea typeface="Tahoma" pitchFamily="34" charset="0"/>
                 <a:cs typeface="Tahoma" pitchFamily="34" charset="0"/>
               </a:rPr>
-              <a:t> PoE</a:t>
-            </a:r>
-            <a:r>
-              <a:rPr lang="en-US" sz="2400" b="1" kern="0" dirty="0" smtClean="0">
-                <a:latin typeface="Tahoma" pitchFamily="34" charset="0"/>
-                <a:ea typeface="Tahoma" pitchFamily="34" charset="0"/>
-                <a:cs typeface="Tahoma" pitchFamily="34" charset="0"/>
-              </a:rPr>
-              <a:t>, via Splitter</a:t>
+              <a:t> PoE, via Splitter</a:t>
             </a:r>
             <a:endParaRPr kumimoji="0" lang="en-US" sz="2400" b="1" i="0" u="none" strike="noStrike" kern="0" cap="none" spc="0" normalizeH="0" baseline="0" noProof="0" dirty="0" smtClean="0">
               <a:ln>
@@ -13307,7 +13236,7 @@
     </p:spTree>
     <p:extLst>
       <p:ext uri="{BB962C8B-B14F-4D97-AF65-F5344CB8AC3E}">
-        <p14:creationId xmlns:p14="http://schemas.microsoft.com/office/powerpoint/2010/main" xmlns="" val="1977087228"/>
+        <p14:creationId xmlns="" xmlns:p14="http://schemas.microsoft.com/office/powerpoint/2010/main" val="1977087228"/>
       </p:ext>
     </p:extLst>
   </p:cSld>
@@ -13667,15 +13596,7 @@
                 <a:ea typeface="Tahoma" pitchFamily="34" charset="0"/>
                 <a:cs typeface="Tahoma" pitchFamily="34" charset="0"/>
               </a:rPr>
-              <a:t>PoE </a:t>
-            </a:r>
-            <a:r>
-              <a:rPr lang="en-US" sz="2400" b="1" dirty="0" smtClean="0">
-                <a:latin typeface="Tahoma" pitchFamily="34" charset="0"/>
-                <a:ea typeface="Tahoma" pitchFamily="34" charset="0"/>
-                <a:cs typeface="Tahoma" pitchFamily="34" charset="0"/>
-              </a:rPr>
-              <a:t> 802.3af (15 W)</a:t>
+              <a:t>PoE  802.3af (15 W)</a:t>
             </a:r>
           </a:p>
           <a:p>
@@ -13737,11 +13658,6 @@
               </a:rPr>
               <a:t> PoE</a:t>
             </a:r>
-            <a:endParaRPr lang="en-US" sz="2400" b="1" dirty="0" smtClean="0">
-              <a:latin typeface="Tahoma" pitchFamily="34" charset="0"/>
-              <a:ea typeface="Tahoma" pitchFamily="34" charset="0"/>
-              <a:cs typeface="Tahoma" pitchFamily="34" charset="0"/>
-            </a:endParaRPr>
           </a:p>
           <a:p>
             <a:pPr marL="857250" lvl="1" indent="-457200">
@@ -13832,7 +13748,7 @@
     </p:spTree>
     <p:extLst>
       <p:ext uri="{BB962C8B-B14F-4D97-AF65-F5344CB8AC3E}">
-        <p14:creationId xmlns:p14="http://schemas.microsoft.com/office/powerpoint/2010/main" xmlns="" val="4102824578"/>
+        <p14:creationId xmlns="" xmlns:p14="http://schemas.microsoft.com/office/powerpoint/2010/main" val="4102824578"/>
       </p:ext>
     </p:extLst>
   </p:cSld>
@@ -15648,15 +15564,7 @@
                 <a:ea typeface="Tahoma" pitchFamily="34" charset="0"/>
                 <a:cs typeface="Tahoma" pitchFamily="34" charset="0"/>
               </a:rPr>
-              <a:t> </a:t>
-            </a:r>
-            <a:r>
-              <a:rPr lang="en-US" sz="2400" b="1" kern="0" dirty="0" smtClean="0">
-                <a:latin typeface="Tahoma" pitchFamily="34" charset="0"/>
-                <a:ea typeface="Tahoma" pitchFamily="34" charset="0"/>
-                <a:cs typeface="Tahoma" pitchFamily="34" charset="0"/>
-              </a:rPr>
-              <a:t>PoE, via </a:t>
+              <a:t> PoE, via </a:t>
             </a:r>
             <a:r>
               <a:rPr lang="en-US" sz="2400" b="1" kern="0" dirty="0" err="1" smtClean="0">
@@ -15948,7 +15856,7 @@
     </p:spTree>
     <p:extLst>
       <p:ext uri="{BB962C8B-B14F-4D97-AF65-F5344CB8AC3E}">
-        <p14:creationId xmlns:p14="http://schemas.microsoft.com/office/powerpoint/2010/main" xmlns="" val="1236525989"/>
+        <p14:creationId xmlns="" xmlns:p14="http://schemas.microsoft.com/office/powerpoint/2010/main" val="1236525989"/>
       </p:ext>
     </p:extLst>
   </p:cSld>
@@ -16026,7 +15934,7 @@
           <a:blip r:embed="rId4" cstate="print">
             <a:extLst>
               <a:ext uri="{28A0092B-C50C-407E-A947-70E740481C1C}">
-                <a14:useLocalDpi xmlns:a14="http://schemas.microsoft.com/office/drawing/2010/main" xmlns="" val="0"/>
+                <a14:useLocalDpi xmlns="" xmlns:a14="http://schemas.microsoft.com/office/drawing/2010/main" val="0"/>
               </a:ext>
             </a:extLst>
           </a:blip>
@@ -16050,14 +15958,14 @@
           <a:effectLst/>
           <a:extLst>
             <a:ext uri="{909E8E84-426E-40DD-AFC4-6F175D3DCCD1}">
-              <a14:hiddenFill xmlns:a14="http://schemas.microsoft.com/office/drawing/2010/main" xmlns="">
+              <a14:hiddenFill xmlns="" xmlns:a14="http://schemas.microsoft.com/office/drawing/2010/main">
                 <a:solidFill>
                   <a:schemeClr val="accent1"/>
                 </a:solidFill>
               </a14:hiddenFill>
             </a:ext>
             <a:ext uri="{91240B29-F687-4F45-9708-019B960494DF}">
-              <a14:hiddenLine xmlns:a14="http://schemas.microsoft.com/office/drawing/2010/main" xmlns="" w="9525">
+              <a14:hiddenLine xmlns="" xmlns:a14="http://schemas.microsoft.com/office/drawing/2010/main" w="9525">
                 <a:solidFill>
                   <a:schemeClr val="tx1"/>
                 </a:solidFill>
@@ -16067,7 +15975,7 @@
               </a14:hiddenLine>
             </a:ext>
             <a:ext uri="{AF507438-7753-43E0-B8FC-AC1667EBCBE1}">
-              <a14:hiddenEffects xmlns:a14="http://schemas.microsoft.com/office/drawing/2010/main" xmlns="">
+              <a14:hiddenEffects xmlns="" xmlns:a14="http://schemas.microsoft.com/office/drawing/2010/main">
                 <a:effectLst>
                   <a:outerShdw dist="35921" dir="2700000" algn="ctr" rotWithShape="0">
                     <a:schemeClr val="bg2"/>
@@ -16858,7 +16766,15 @@
                 <a:ea typeface="Tahoma" pitchFamily="34" charset="0"/>
                 <a:cs typeface="Tahoma" pitchFamily="34" charset="0"/>
               </a:rPr>
-              <a:t> </a:t>
+              <a:t> Internet </a:t>
+            </a:r>
+            <a:r>
+              <a:rPr kumimoji="1" lang="en-US" altLang="zh-TW" dirty="0" err="1" smtClean="0">
+                <a:latin typeface="Tahoma" pitchFamily="34" charset="0"/>
+                <a:ea typeface="Tahoma" pitchFamily="34" charset="0"/>
+                <a:cs typeface="Tahoma" pitchFamily="34" charset="0"/>
+              </a:rPr>
+              <a:t>não</a:t>
             </a:r>
             <a:r>
               <a:rPr kumimoji="1" lang="en-US" altLang="zh-TW" dirty="0" smtClean="0">
@@ -16866,31 +16782,7 @@
                 <a:ea typeface="Tahoma" pitchFamily="34" charset="0"/>
                 <a:cs typeface="Tahoma" pitchFamily="34" charset="0"/>
               </a:rPr>
-              <a:t>Internet </a:t>
-            </a:r>
-            <a:r>
-              <a:rPr kumimoji="1" lang="en-US" altLang="zh-TW" dirty="0" err="1" smtClean="0">
-                <a:latin typeface="Tahoma" pitchFamily="34" charset="0"/>
-                <a:ea typeface="Tahoma" pitchFamily="34" charset="0"/>
-                <a:cs typeface="Tahoma" pitchFamily="34" charset="0"/>
-              </a:rPr>
-              <a:t>não</a:t>
-            </a:r>
-            <a:r>
-              <a:rPr kumimoji="1" lang="en-US" altLang="zh-TW" dirty="0" smtClean="0">
-                <a:latin typeface="Tahoma" pitchFamily="34" charset="0"/>
-                <a:ea typeface="Tahoma" pitchFamily="34" charset="0"/>
-                <a:cs typeface="Tahoma" pitchFamily="34" charset="0"/>
-              </a:rPr>
-              <a:t> </a:t>
-            </a:r>
-            <a:r>
-              <a:rPr kumimoji="1" lang="en-US" altLang="zh-TW" dirty="0" smtClean="0">
-                <a:latin typeface="Tahoma" pitchFamily="34" charset="0"/>
-                <a:ea typeface="Tahoma" pitchFamily="34" charset="0"/>
-                <a:cs typeface="Tahoma" pitchFamily="34" charset="0"/>
-              </a:rPr>
-              <a:t>PoE</a:t>
+              <a:t> PoE</a:t>
             </a:r>
           </a:p>
           <a:p>
@@ -17024,15 +16916,7 @@
                 <a:ea typeface="Tahoma" pitchFamily="34" charset="0"/>
                 <a:cs typeface="Tahoma" pitchFamily="34" charset="0"/>
               </a:rPr>
-              <a:t>Dados </a:t>
-            </a:r>
-            <a:r>
-              <a:rPr kumimoji="1" lang="en-US" altLang="zh-TW" dirty="0" smtClean="0">
-                <a:latin typeface="Tahoma" pitchFamily="34" charset="0"/>
-                <a:ea typeface="Tahoma" pitchFamily="34" charset="0"/>
-                <a:cs typeface="Tahoma" pitchFamily="34" charset="0"/>
-              </a:rPr>
-              <a:t>Ethernet </a:t>
+              <a:t>Dados Ethernet </a:t>
             </a:r>
             <a:r>
               <a:rPr kumimoji="1" lang="en-US" altLang="zh-TW" dirty="0">
@@ -17980,7 +17864,7 @@
             </a:clrChange>
             <a:extLst>
               <a:ext uri="{28A0092B-C50C-407E-A947-70E740481C1C}">
-                <a14:useLocalDpi xmlns:a14="http://schemas.microsoft.com/office/drawing/2010/main" xmlns="" val="0"/>
+                <a14:useLocalDpi xmlns="" xmlns:a14="http://schemas.microsoft.com/office/drawing/2010/main" val="0"/>
               </a:ext>
             </a:extLst>
           </a:blip>
@@ -18004,14 +17888,14 @@
           <a:effectLst/>
           <a:extLst>
             <a:ext uri="{909E8E84-426E-40DD-AFC4-6F175D3DCCD1}">
-              <a14:hiddenFill xmlns:a14="http://schemas.microsoft.com/office/drawing/2010/main" xmlns="">
+              <a14:hiddenFill xmlns="" xmlns:a14="http://schemas.microsoft.com/office/drawing/2010/main">
                 <a:solidFill>
                   <a:schemeClr val="accent1"/>
                 </a:solidFill>
               </a14:hiddenFill>
             </a:ext>
             <a:ext uri="{91240B29-F687-4F45-9708-019B960494DF}">
-              <a14:hiddenLine xmlns:a14="http://schemas.microsoft.com/office/drawing/2010/main" xmlns="" w="9525">
+              <a14:hiddenLine xmlns="" xmlns:a14="http://schemas.microsoft.com/office/drawing/2010/main" w="9525">
                 <a:solidFill>
                   <a:schemeClr val="tx1"/>
                 </a:solidFill>
@@ -18021,7 +17905,7 @@
               </a14:hiddenLine>
             </a:ext>
             <a:ext uri="{AF507438-7753-43E0-B8FC-AC1667EBCBE1}">
-              <a14:hiddenEffects xmlns:a14="http://schemas.microsoft.com/office/drawing/2010/main" xmlns="">
+              <a14:hiddenEffects xmlns="" xmlns:a14="http://schemas.microsoft.com/office/drawing/2010/main">
                 <a:effectLst>
                   <a:outerShdw dist="35921" dir="2700000" algn="ctr" rotWithShape="0">
                     <a:schemeClr val="bg2"/>
@@ -18526,7 +18410,7 @@
     </p:spTree>
     <p:extLst>
       <p:ext uri="{BB962C8B-B14F-4D97-AF65-F5344CB8AC3E}">
-        <p14:creationId xmlns:p14="http://schemas.microsoft.com/office/powerpoint/2010/main" xmlns="" val="509655023"/>
+        <p14:creationId xmlns="" xmlns:p14="http://schemas.microsoft.com/office/powerpoint/2010/main" val="509655023"/>
       </p:ext>
     </p:extLst>
   </p:cSld>
@@ -18683,7 +18567,7 @@
     </p:spTree>
     <p:extLst>
       <p:ext uri="{BB962C8B-B14F-4D97-AF65-F5344CB8AC3E}">
-        <p14:creationId xmlns:p14="http://schemas.microsoft.com/office/powerpoint/2010/main" xmlns="" val="18606780"/>
+        <p14:creationId xmlns="" xmlns:p14="http://schemas.microsoft.com/office/powerpoint/2010/main" val="18606780"/>
       </p:ext>
     </p:extLst>
   </p:cSld>
@@ -18824,10 +18708,6 @@
               </a:rPr>
               <a:t>trend.net.br</a:t>
             </a:r>
-            <a:endParaRPr lang="en-US" sz="4400" b="1" dirty="0" smtClean="0">
-              <a:ea typeface="Arial Unicode MS" pitchFamily="34" charset="-128"/>
-              <a:cs typeface="Tahoma" pitchFamily="34" charset="0"/>
-            </a:endParaRPr>
           </a:p>
           <a:p>
             <a:pPr algn="ctr">
@@ -18863,7 +18743,7 @@
     </p:spTree>
     <p:extLst>
       <p:ext uri="{BB962C8B-B14F-4D97-AF65-F5344CB8AC3E}">
-        <p14:creationId xmlns:p14="http://schemas.microsoft.com/office/powerpoint/2010/main" xmlns="" val="1609054859"/>
+        <p14:creationId xmlns="" xmlns:p14="http://schemas.microsoft.com/office/powerpoint/2010/main" val="1609054859"/>
       </p:ext>
     </p:extLst>
   </p:cSld>
@@ -19161,15 +19041,7 @@
                 <a:ea typeface="Tahoma" pitchFamily="34" charset="0"/>
                 <a:cs typeface="Tahoma" pitchFamily="34" charset="0"/>
               </a:rPr>
-              <a:t>q</a:t>
-            </a:r>
-            <a:r>
-              <a:rPr lang="en-US" sz="2800" b="1" dirty="0" err="1" smtClean="0">
-                <a:latin typeface="Tahoma" pitchFamily="34" charset="0"/>
-                <a:ea typeface="Tahoma" pitchFamily="34" charset="0"/>
-                <a:cs typeface="Tahoma" pitchFamily="34" charset="0"/>
-              </a:rPr>
-              <a:t>ue</a:t>
+              <a:t>que</a:t>
             </a:r>
             <a:r>
               <a:rPr lang="en-US" sz="2800" b="1" dirty="0" smtClean="0">
@@ -19319,7 +19191,15 @@
                 <a:ea typeface="Tahoma" pitchFamily="34" charset="0"/>
                 <a:cs typeface="Tahoma" pitchFamily="34" charset="0"/>
               </a:rPr>
-              <a:t> com </a:t>
+              <a:t> com dados, </a:t>
+            </a:r>
+            <a:r>
+              <a:rPr lang="en-US" sz="2400" dirty="0" err="1" smtClean="0">
+                <a:latin typeface="Tahoma" pitchFamily="34" charset="0"/>
+                <a:ea typeface="Tahoma" pitchFamily="34" charset="0"/>
+                <a:cs typeface="Tahoma" pitchFamily="34" charset="0"/>
+              </a:rPr>
+              <a:t>através</a:t>
             </a:r>
             <a:r>
               <a:rPr lang="en-US" sz="2400" dirty="0" smtClean="0">
@@ -19327,7 +19207,15 @@
                 <a:ea typeface="Tahoma" pitchFamily="34" charset="0"/>
                 <a:cs typeface="Tahoma" pitchFamily="34" charset="0"/>
               </a:rPr>
-              <a:t>dados</a:t>
+              <a:t> de </a:t>
+            </a:r>
+            <a:r>
+              <a:rPr lang="en-US" sz="2400" dirty="0" err="1" smtClean="0">
+                <a:latin typeface="Tahoma" pitchFamily="34" charset="0"/>
+                <a:ea typeface="Tahoma" pitchFamily="34" charset="0"/>
+                <a:cs typeface="Tahoma" pitchFamily="34" charset="0"/>
+              </a:rPr>
+              <a:t>cabos</a:t>
             </a:r>
             <a:r>
               <a:rPr lang="en-US" sz="2400" dirty="0" smtClean="0">
@@ -19335,6 +19223,54 @@
                 <a:ea typeface="Tahoma" pitchFamily="34" charset="0"/>
                 <a:cs typeface="Tahoma" pitchFamily="34" charset="0"/>
               </a:rPr>
+              <a:t> de par </a:t>
+            </a:r>
+            <a:r>
+              <a:rPr lang="en-US" sz="2400" dirty="0" err="1" smtClean="0">
+                <a:latin typeface="Tahoma" pitchFamily="34" charset="0"/>
+                <a:ea typeface="Tahoma" pitchFamily="34" charset="0"/>
+                <a:cs typeface="Tahoma" pitchFamily="34" charset="0"/>
+              </a:rPr>
+              <a:t>trançado</a:t>
+            </a:r>
+            <a:r>
+              <a:rPr lang="en-US" sz="2400" dirty="0" smtClean="0">
+                <a:latin typeface="Tahoma" pitchFamily="34" charset="0"/>
+                <a:ea typeface="Tahoma" pitchFamily="34" charset="0"/>
+                <a:cs typeface="Tahoma" pitchFamily="34" charset="0"/>
+              </a:rPr>
+              <a:t> </a:t>
+            </a:r>
+            <a:r>
+              <a:rPr lang="en-US" sz="2400" dirty="0" err="1" smtClean="0">
+                <a:latin typeface="Tahoma" pitchFamily="34" charset="0"/>
+                <a:ea typeface="Tahoma" pitchFamily="34" charset="0"/>
+                <a:cs typeface="Tahoma" pitchFamily="34" charset="0"/>
+              </a:rPr>
+              <a:t>padrão</a:t>
+            </a:r>
+            <a:r>
+              <a:rPr lang="en-US" sz="2400" dirty="0" smtClean="0">
+                <a:latin typeface="Tahoma" pitchFamily="34" charset="0"/>
+                <a:ea typeface="Tahoma" pitchFamily="34" charset="0"/>
+                <a:cs typeface="Tahoma" pitchFamily="34" charset="0"/>
+              </a:rPr>
+              <a:t> Ethernet. Com </a:t>
+            </a:r>
+            <a:r>
+              <a:rPr lang="en-US" sz="2400" dirty="0" err="1" smtClean="0">
+                <a:latin typeface="Tahoma" pitchFamily="34" charset="0"/>
+                <a:ea typeface="Tahoma" pitchFamily="34" charset="0"/>
+                <a:cs typeface="Tahoma" pitchFamily="34" charset="0"/>
+              </a:rPr>
+              <a:t>isso</a:t>
+            </a:r>
+            <a:r>
+              <a:rPr lang="en-US" sz="2400" dirty="0" smtClean="0">
+                <a:latin typeface="Tahoma" pitchFamily="34" charset="0"/>
+                <a:ea typeface="Tahoma" pitchFamily="34" charset="0"/>
+                <a:cs typeface="Tahoma" pitchFamily="34" charset="0"/>
+              </a:rPr>
               <a:t>, </a:t>
             </a:r>
             <a:r>
@@ -19343,7 +19279,7 @@
                 <a:ea typeface="Tahoma" pitchFamily="34" charset="0"/>
                 <a:cs typeface="Tahoma" pitchFamily="34" charset="0"/>
               </a:rPr>
-              <a:t>através</a:t>
+              <a:t>pode</a:t>
             </a:r>
             <a:r>
               <a:rPr lang="en-US" sz="2400" dirty="0" smtClean="0">
@@ -19351,7 +19287,7 @@
                 <a:ea typeface="Tahoma" pitchFamily="34" charset="0"/>
                 <a:cs typeface="Tahoma" pitchFamily="34" charset="0"/>
               </a:rPr>
-              <a:t> de </a:t>
+              <a:t>-se </a:t>
             </a:r>
             <a:r>
               <a:rPr lang="en-US" sz="2400" dirty="0" err="1" smtClean="0">
@@ -19359,7 +19295,7 @@
                 <a:ea typeface="Tahoma" pitchFamily="34" charset="0"/>
                 <a:cs typeface="Tahoma" pitchFamily="34" charset="0"/>
               </a:rPr>
-              <a:t>cabos</a:t>
+              <a:t>alimentar</a:t>
             </a:r>
             <a:r>
               <a:rPr lang="en-US" sz="2400" dirty="0" smtClean="0">
@@ -19370,12 +19306,20 @@
               <a:t> </a:t>
             </a:r>
             <a:r>
+              <a:rPr lang="en-US" sz="2400" dirty="0" err="1" smtClean="0">
+                <a:latin typeface="Tahoma" pitchFamily="34" charset="0"/>
+                <a:ea typeface="Tahoma" pitchFamily="34" charset="0"/>
+                <a:cs typeface="Tahoma" pitchFamily="34" charset="0"/>
+              </a:rPr>
+              <a:t>dispositivos</a:t>
+            </a:r>
+            <a:r>
               <a:rPr lang="en-US" sz="2400" dirty="0" smtClean="0">
                 <a:latin typeface="Tahoma" pitchFamily="34" charset="0"/>
                 <a:ea typeface="Tahoma" pitchFamily="34" charset="0"/>
                 <a:cs typeface="Tahoma" pitchFamily="34" charset="0"/>
               </a:rPr>
-              <a:t>de par </a:t>
+              <a:t> </a:t>
             </a:r>
             <a:r>
               <a:rPr lang="en-US" sz="2400" dirty="0" err="1" smtClean="0">
@@ -19383,7 +19327,7 @@
                 <a:ea typeface="Tahoma" pitchFamily="34" charset="0"/>
                 <a:cs typeface="Tahoma" pitchFamily="34" charset="0"/>
               </a:rPr>
-              <a:t>trançado</a:t>
+              <a:t>remotos</a:t>
             </a:r>
             <a:r>
               <a:rPr lang="en-US" sz="2400" dirty="0" smtClean="0">
@@ -19399,7 +19343,7 @@
                 <a:ea typeface="Tahoma" pitchFamily="34" charset="0"/>
                 <a:cs typeface="Tahoma" pitchFamily="34" charset="0"/>
               </a:rPr>
-              <a:t>padrão</a:t>
+              <a:t>em</a:t>
             </a:r>
             <a:r>
               <a:rPr lang="en-US" sz="2400" dirty="0" smtClean="0">
@@ -19410,12 +19354,20 @@
               <a:t> </a:t>
             </a:r>
             <a:r>
+              <a:rPr lang="en-US" sz="2400" dirty="0" err="1" smtClean="0">
+                <a:latin typeface="Tahoma" pitchFamily="34" charset="0"/>
+                <a:ea typeface="Tahoma" pitchFamily="34" charset="0"/>
+                <a:cs typeface="Tahoma" pitchFamily="34" charset="0"/>
+              </a:rPr>
+              <a:t>uma</a:t>
+            </a:r>
+            <a:r>
               <a:rPr lang="en-US" sz="2400" dirty="0" smtClean="0">
                 <a:latin typeface="Tahoma" pitchFamily="34" charset="0"/>
                 <a:ea typeface="Tahoma" pitchFamily="34" charset="0"/>
                 <a:cs typeface="Tahoma" pitchFamily="34" charset="0"/>
               </a:rPr>
-              <a:t>Ethernet. Com </a:t>
+              <a:t> </a:t>
             </a:r>
             <a:r>
               <a:rPr lang="en-US" sz="2400" dirty="0" err="1" smtClean="0">
@@ -19423,7 +19375,7 @@
                 <a:ea typeface="Tahoma" pitchFamily="34" charset="0"/>
                 <a:cs typeface="Tahoma" pitchFamily="34" charset="0"/>
               </a:rPr>
-              <a:t>isso</a:t>
+              <a:t>rede</a:t>
             </a:r>
             <a:r>
               <a:rPr lang="en-US" sz="2400" dirty="0" smtClean="0">
@@ -19431,127 +19383,7 @@
                 <a:ea typeface="Tahoma" pitchFamily="34" charset="0"/>
                 <a:cs typeface="Tahoma" pitchFamily="34" charset="0"/>
               </a:rPr>
-              <a:t>, </a:t>
-            </a:r>
-            <a:r>
-              <a:rPr lang="en-US" sz="2400" dirty="0" err="1" smtClean="0">
-                <a:latin typeface="Tahoma" pitchFamily="34" charset="0"/>
-                <a:ea typeface="Tahoma" pitchFamily="34" charset="0"/>
-                <a:cs typeface="Tahoma" pitchFamily="34" charset="0"/>
-              </a:rPr>
-              <a:t>pode</a:t>
-            </a:r>
-            <a:r>
-              <a:rPr lang="en-US" sz="2400" dirty="0" smtClean="0">
-                <a:latin typeface="Tahoma" pitchFamily="34" charset="0"/>
-                <a:ea typeface="Tahoma" pitchFamily="34" charset="0"/>
-                <a:cs typeface="Tahoma" pitchFamily="34" charset="0"/>
-              </a:rPr>
-              <a:t>-se </a:t>
-            </a:r>
-            <a:r>
-              <a:rPr lang="en-US" sz="2400" dirty="0" err="1" smtClean="0">
-                <a:latin typeface="Tahoma" pitchFamily="34" charset="0"/>
-                <a:ea typeface="Tahoma" pitchFamily="34" charset="0"/>
-                <a:cs typeface="Tahoma" pitchFamily="34" charset="0"/>
-              </a:rPr>
-              <a:t>alimentar</a:t>
-            </a:r>
-            <a:r>
-              <a:rPr lang="en-US" sz="2400" dirty="0" smtClean="0">
-                <a:latin typeface="Tahoma" pitchFamily="34" charset="0"/>
-                <a:ea typeface="Tahoma" pitchFamily="34" charset="0"/>
-                <a:cs typeface="Tahoma" pitchFamily="34" charset="0"/>
-              </a:rPr>
-              <a:t> </a:t>
-            </a:r>
-            <a:r>
-              <a:rPr lang="en-US" sz="2400" dirty="0" err="1" smtClean="0">
-                <a:latin typeface="Tahoma" pitchFamily="34" charset="0"/>
-                <a:ea typeface="Tahoma" pitchFamily="34" charset="0"/>
-                <a:cs typeface="Tahoma" pitchFamily="34" charset="0"/>
-              </a:rPr>
-              <a:t>dispositivos</a:t>
-            </a:r>
-            <a:r>
-              <a:rPr lang="en-US" sz="2400" dirty="0" smtClean="0">
-                <a:latin typeface="Tahoma" pitchFamily="34" charset="0"/>
-                <a:ea typeface="Tahoma" pitchFamily="34" charset="0"/>
-                <a:cs typeface="Tahoma" pitchFamily="34" charset="0"/>
-              </a:rPr>
-              <a:t> </a:t>
-            </a:r>
-            <a:r>
-              <a:rPr lang="en-US" sz="2400" dirty="0" err="1" smtClean="0">
-                <a:latin typeface="Tahoma" pitchFamily="34" charset="0"/>
-                <a:ea typeface="Tahoma" pitchFamily="34" charset="0"/>
-                <a:cs typeface="Tahoma" pitchFamily="34" charset="0"/>
-              </a:rPr>
-              <a:t>remotos</a:t>
-            </a:r>
-            <a:r>
-              <a:rPr lang="en-US" sz="2400" dirty="0" smtClean="0">
-                <a:latin typeface="Tahoma" pitchFamily="34" charset="0"/>
-                <a:ea typeface="Tahoma" pitchFamily="34" charset="0"/>
-                <a:cs typeface="Tahoma" pitchFamily="34" charset="0"/>
-              </a:rPr>
-              <a:t> </a:t>
-            </a:r>
-            <a:r>
-              <a:rPr lang="en-US" sz="2400" dirty="0" err="1" smtClean="0">
-                <a:latin typeface="Tahoma" pitchFamily="34" charset="0"/>
-                <a:ea typeface="Tahoma" pitchFamily="34" charset="0"/>
-                <a:cs typeface="Tahoma" pitchFamily="34" charset="0"/>
-              </a:rPr>
-              <a:t>em</a:t>
-            </a:r>
-            <a:r>
-              <a:rPr lang="en-US" sz="2400" dirty="0" smtClean="0">
-                <a:latin typeface="Tahoma" pitchFamily="34" charset="0"/>
-                <a:ea typeface="Tahoma" pitchFamily="34" charset="0"/>
-                <a:cs typeface="Tahoma" pitchFamily="34" charset="0"/>
-              </a:rPr>
-              <a:t> </a:t>
-            </a:r>
-            <a:r>
-              <a:rPr lang="en-US" sz="2400" dirty="0" err="1" smtClean="0">
-                <a:latin typeface="Tahoma" pitchFamily="34" charset="0"/>
-                <a:ea typeface="Tahoma" pitchFamily="34" charset="0"/>
-                <a:cs typeface="Tahoma" pitchFamily="34" charset="0"/>
-              </a:rPr>
-              <a:t>uma</a:t>
-            </a:r>
-            <a:r>
-              <a:rPr lang="en-US" sz="2400" dirty="0" smtClean="0">
-                <a:latin typeface="Tahoma" pitchFamily="34" charset="0"/>
-                <a:ea typeface="Tahoma" pitchFamily="34" charset="0"/>
-                <a:cs typeface="Tahoma" pitchFamily="34" charset="0"/>
-              </a:rPr>
-              <a:t> </a:t>
-            </a:r>
-            <a:r>
-              <a:rPr lang="en-US" sz="2400" dirty="0" err="1" smtClean="0">
-                <a:latin typeface="Tahoma" pitchFamily="34" charset="0"/>
-                <a:ea typeface="Tahoma" pitchFamily="34" charset="0"/>
-                <a:cs typeface="Tahoma" pitchFamily="34" charset="0"/>
-              </a:rPr>
-              <a:t>rede</a:t>
-            </a:r>
-            <a:r>
-              <a:rPr lang="en-US" sz="2400" dirty="0" smtClean="0">
-                <a:latin typeface="Tahoma" pitchFamily="34" charset="0"/>
-                <a:ea typeface="Tahoma" pitchFamily="34" charset="0"/>
-                <a:cs typeface="Tahoma" pitchFamily="34" charset="0"/>
-              </a:rPr>
-              <a:t> </a:t>
-            </a:r>
-            <a:r>
-              <a:rPr lang="en-US" sz="2400" dirty="0" smtClean="0">
-                <a:latin typeface="Tahoma" pitchFamily="34" charset="0"/>
-                <a:ea typeface="Tahoma" pitchFamily="34" charset="0"/>
-                <a:cs typeface="Tahoma" pitchFamily="34" charset="0"/>
-              </a:rPr>
-              <a:t>local, </a:t>
+              <a:t> local, </a:t>
             </a:r>
             <a:r>
               <a:rPr lang="en-US" sz="2400" dirty="0" err="1" smtClean="0">
@@ -20102,7 +19934,7 @@
     </p:spTree>
     <p:extLst>
       <p:ext uri="{BB962C8B-B14F-4D97-AF65-F5344CB8AC3E}">
-        <p14:creationId xmlns:p14="http://schemas.microsoft.com/office/powerpoint/2010/main" xmlns="" val="1811188191"/>
+        <p14:creationId xmlns="" xmlns:p14="http://schemas.microsoft.com/office/powerpoint/2010/main" val="1811188191"/>
       </p:ext>
     </p:extLst>
   </p:cSld>
@@ -20438,15 +20270,7 @@
                 <a:ea typeface="Tahoma" pitchFamily="34" charset="0"/>
                 <a:cs typeface="Tahoma" pitchFamily="34" charset="0"/>
               </a:rPr>
-              <a:t>custo</a:t>
-            </a:r>
-            <a:r>
-              <a:rPr lang="en-US" sz="2400" dirty="0" err="1" smtClean="0">
-                <a:latin typeface="Tahoma" pitchFamily="34" charset="0"/>
-                <a:ea typeface="Tahoma" pitchFamily="34" charset="0"/>
-                <a:cs typeface="Tahoma" pitchFamily="34" charset="0"/>
-              </a:rPr>
-              <a:t>s</a:t>
+              <a:t>custos</a:t>
             </a:r>
             <a:r>
               <a:rPr lang="en-US" sz="2400" dirty="0" smtClean="0">
@@ -20613,15 +20437,7 @@
                 <a:ea typeface="Tahoma" pitchFamily="34" charset="0"/>
                 <a:cs typeface="Tahoma" pitchFamily="34" charset="0"/>
               </a:rPr>
-              <a:t>inde</a:t>
-            </a:r>
-            <a:r>
-              <a:rPr lang="en-US" sz="2400" dirty="0" err="1" smtClean="0">
-                <a:latin typeface="Tahoma" pitchFamily="34" charset="0"/>
-                <a:ea typeface="Tahoma" pitchFamily="34" charset="0"/>
-                <a:cs typeface="Tahoma" pitchFamily="34" charset="0"/>
-              </a:rPr>
-              <a:t>pendentemente</a:t>
+              <a:t>independentemente</a:t>
             </a:r>
             <a:r>
               <a:rPr lang="en-US" sz="2400" dirty="0" smtClean="0">
@@ -20629,15 +20445,7 @@
                 <a:ea typeface="Tahoma" pitchFamily="34" charset="0"/>
                 <a:cs typeface="Tahoma" pitchFamily="34" charset="0"/>
               </a:rPr>
-              <a:t> </a:t>
-            </a:r>
-            <a:r>
-              <a:rPr lang="en-US" sz="2400" dirty="0" smtClean="0">
-                <a:latin typeface="Tahoma" pitchFamily="34" charset="0"/>
-                <a:ea typeface="Tahoma" pitchFamily="34" charset="0"/>
-                <a:cs typeface="Tahoma" pitchFamily="34" charset="0"/>
-              </a:rPr>
-              <a:t>das </a:t>
+              <a:t> das </a:t>
             </a:r>
             <a:r>
               <a:rPr lang="en-US" sz="2400" dirty="0" err="1" smtClean="0">
@@ -20890,7 +20698,7 @@
           <a:blip r:embed="rId4" cstate="print">
             <a:extLst>
               <a:ext uri="{28A0092B-C50C-407E-A947-70E740481C1C}">
-                <a14:useLocalDpi xmlns:a14="http://schemas.microsoft.com/office/drawing/2010/main" xmlns="" val="0"/>
+                <a14:useLocalDpi xmlns="" xmlns:a14="http://schemas.microsoft.com/office/drawing/2010/main" val="0"/>
               </a:ext>
             </a:extLst>
           </a:blip>
@@ -20910,7 +20718,7 @@
           <a:noFill/>
           <a:extLst>
             <a:ext uri="{909E8E84-426E-40DD-AFC4-6F175D3DCCD1}">
-              <a14:hiddenFill xmlns:a14="http://schemas.microsoft.com/office/drawing/2010/main" xmlns="">
+              <a14:hiddenFill xmlns="" xmlns:a14="http://schemas.microsoft.com/office/drawing/2010/main">
                 <a:solidFill>
                   <a:srgbClr val="FFFFFF"/>
                 </a:solidFill>
@@ -20986,7 +20794,7 @@
     </p:spTree>
     <p:extLst>
       <p:ext uri="{BB962C8B-B14F-4D97-AF65-F5344CB8AC3E}">
-        <p14:creationId xmlns:p14="http://schemas.microsoft.com/office/powerpoint/2010/main" xmlns="" val="1587716228"/>
+        <p14:creationId xmlns="" xmlns:p14="http://schemas.microsoft.com/office/powerpoint/2010/main" val="1587716228"/>
       </p:ext>
     </p:extLst>
   </p:cSld>
@@ -21416,23 +21224,7 @@
                 <a:ea typeface="Tahoma" pitchFamily="34" charset="0"/>
                 <a:cs typeface="Tahoma" pitchFamily="34" charset="0"/>
               </a:rPr>
-              <a:t> </a:t>
-            </a:r>
-            <a:r>
-              <a:rPr lang="en-US" sz="2400" dirty="0" smtClean="0">
-                <a:latin typeface="Tahoma" pitchFamily="34" charset="0"/>
-                <a:ea typeface="Tahoma" pitchFamily="34" charset="0"/>
-                <a:cs typeface="Tahoma" pitchFamily="34" charset="0"/>
-              </a:rPr>
-              <a:t>Ethernet Cat </a:t>
-            </a:r>
-            <a:r>
-              <a:rPr lang="en-US" sz="2400" dirty="0" smtClean="0">
-                <a:latin typeface="Tahoma" pitchFamily="34" charset="0"/>
-                <a:ea typeface="Tahoma" pitchFamily="34" charset="0"/>
-                <a:cs typeface="Tahoma" pitchFamily="34" charset="0"/>
-              </a:rPr>
-              <a:t>5, 5E </a:t>
+              <a:t> Ethernet Cat 5, 5E </a:t>
             </a:r>
             <a:r>
               <a:rPr lang="en-US" sz="2400" dirty="0" err="1" smtClean="0">
@@ -21592,7 +21384,7 @@
           <a:blip r:embed="rId3" cstate="print">
             <a:extLst>
               <a:ext uri="{28A0092B-C50C-407E-A947-70E740481C1C}">
-                <a14:useLocalDpi xmlns:a14="http://schemas.microsoft.com/office/drawing/2010/main" xmlns="" val="0"/>
+                <a14:useLocalDpi xmlns="" xmlns:a14="http://schemas.microsoft.com/office/drawing/2010/main" val="0"/>
               </a:ext>
             </a:extLst>
           </a:blip>
@@ -21612,7 +21404,7 @@
           <a:noFill/>
           <a:extLst>
             <a:ext uri="{909E8E84-426E-40DD-AFC4-6F175D3DCCD1}">
-              <a14:hiddenFill xmlns:a14="http://schemas.microsoft.com/office/drawing/2010/main" xmlns="">
+              <a14:hiddenFill xmlns="" xmlns:a14="http://schemas.microsoft.com/office/drawing/2010/main">
                 <a:solidFill>
                   <a:srgbClr val="FFFFFF"/>
                 </a:solidFill>
@@ -21624,7 +21416,7 @@
     </p:spTree>
     <p:extLst>
       <p:ext uri="{BB962C8B-B14F-4D97-AF65-F5344CB8AC3E}">
-        <p14:creationId xmlns:p14="http://schemas.microsoft.com/office/powerpoint/2010/main" xmlns="" val="3328759648"/>
+        <p14:creationId xmlns="" xmlns:p14="http://schemas.microsoft.com/office/powerpoint/2010/main" val="3328759648"/>
       </p:ext>
     </p:extLst>
   </p:cSld>
@@ -21910,7 +21702,7 @@
             <a:blip r:embed="rId3" cstate="print">
               <a:extLst>
                 <a:ext uri="{28A0092B-C50C-407E-A947-70E740481C1C}">
-                  <a14:useLocalDpi xmlns:a14="http://schemas.microsoft.com/office/drawing/2010/main" xmlns="" val="0"/>
+                  <a14:useLocalDpi xmlns="" xmlns:a14="http://schemas.microsoft.com/office/drawing/2010/main" val="0"/>
                 </a:ext>
               </a:extLst>
             </a:blip>
@@ -21930,7 +21722,7 @@
             <a:noFill/>
             <a:extLst>
               <a:ext uri="{909E8E84-426E-40DD-AFC4-6F175D3DCCD1}">
-                <a14:hiddenFill xmlns:a14="http://schemas.microsoft.com/office/drawing/2010/main" xmlns="">
+                <a14:hiddenFill xmlns="" xmlns:a14="http://schemas.microsoft.com/office/drawing/2010/main">
                   <a:solidFill>
                     <a:srgbClr val="FFFFFF"/>
                   </a:solidFill>
@@ -21951,7 +21743,7 @@
             <a:blip r:embed="rId4" cstate="print">
               <a:extLst>
                 <a:ext uri="{28A0092B-C50C-407E-A947-70E740481C1C}">
-                  <a14:useLocalDpi xmlns:a14="http://schemas.microsoft.com/office/drawing/2010/main" xmlns="" val="0"/>
+                  <a14:useLocalDpi xmlns="" xmlns:a14="http://schemas.microsoft.com/office/drawing/2010/main" val="0"/>
                 </a:ext>
               </a:extLst>
             </a:blip>
@@ -21971,7 +21763,7 @@
             <a:noFill/>
             <a:extLst>
               <a:ext uri="{909E8E84-426E-40DD-AFC4-6F175D3DCCD1}">
-                <a14:hiddenFill xmlns:a14="http://schemas.microsoft.com/office/drawing/2010/main" xmlns="">
+                <a14:hiddenFill xmlns="" xmlns:a14="http://schemas.microsoft.com/office/drawing/2010/main">
                   <a:solidFill>
                     <a:srgbClr val="FFFFFF"/>
                   </a:solidFill>
@@ -22094,7 +21886,7 @@
               </a:clrChange>
               <a:extLst>
                 <a:ext uri="{28A0092B-C50C-407E-A947-70E740481C1C}">
-                  <a14:useLocalDpi xmlns:a14="http://schemas.microsoft.com/office/drawing/2010/main" xmlns="" val="0"/>
+                  <a14:useLocalDpi xmlns="" xmlns:a14="http://schemas.microsoft.com/office/drawing/2010/main" val="0"/>
                 </a:ext>
               </a:extLst>
             </a:blip>
@@ -22118,14 +21910,14 @@
             <a:effectLst/>
             <a:extLst>
               <a:ext uri="{909E8E84-426E-40DD-AFC4-6F175D3DCCD1}">
-                <a14:hiddenFill xmlns:a14="http://schemas.microsoft.com/office/drawing/2010/main" xmlns="">
+                <a14:hiddenFill xmlns="" xmlns:a14="http://schemas.microsoft.com/office/drawing/2010/main">
                   <a:solidFill>
                     <a:schemeClr val="accent1"/>
                   </a:solidFill>
                 </a14:hiddenFill>
               </a:ext>
               <a:ext uri="{91240B29-F687-4F45-9708-019B960494DF}">
-                <a14:hiddenLine xmlns:a14="http://schemas.microsoft.com/office/drawing/2010/main" xmlns="" w="9525">
+                <a14:hiddenLine xmlns="" xmlns:a14="http://schemas.microsoft.com/office/drawing/2010/main" w="9525">
                   <a:solidFill>
                     <a:schemeClr val="tx1"/>
                   </a:solidFill>
@@ -22135,7 +21927,7 @@
                 </a14:hiddenLine>
               </a:ext>
               <a:ext uri="{AF507438-7753-43E0-B8FC-AC1667EBCBE1}">
-                <a14:hiddenEffects xmlns:a14="http://schemas.microsoft.com/office/drawing/2010/main" xmlns="">
+                <a14:hiddenEffects xmlns="" xmlns:a14="http://schemas.microsoft.com/office/drawing/2010/main">
                   <a:effectLst>
                     <a:outerShdw dist="35921" dir="2700000" algn="ctr" rotWithShape="0">
                       <a:schemeClr val="bg2"/>
@@ -22214,7 +22006,7 @@
               </a:clrChange>
               <a:extLst>
                 <a:ext uri="{28A0092B-C50C-407E-A947-70E740481C1C}">
-                  <a14:useLocalDpi xmlns:a14="http://schemas.microsoft.com/office/drawing/2010/main" xmlns="" val="0"/>
+                  <a14:useLocalDpi xmlns="" xmlns:a14="http://schemas.microsoft.com/office/drawing/2010/main" val="0"/>
                 </a:ext>
               </a:extLst>
             </a:blip>
@@ -22238,14 +22030,14 @@
             <a:effectLst/>
             <a:extLst>
               <a:ext uri="{909E8E84-426E-40DD-AFC4-6F175D3DCCD1}">
-                <a14:hiddenFill xmlns:a14="http://schemas.microsoft.com/office/drawing/2010/main" xmlns="">
+                <a14:hiddenFill xmlns="" xmlns:a14="http://schemas.microsoft.com/office/drawing/2010/main">
                   <a:solidFill>
                     <a:schemeClr val="accent1"/>
                   </a:solidFill>
                 </a14:hiddenFill>
               </a:ext>
               <a:ext uri="{91240B29-F687-4F45-9708-019B960494DF}">
-                <a14:hiddenLine xmlns:a14="http://schemas.microsoft.com/office/drawing/2010/main" xmlns="" w="9525">
+                <a14:hiddenLine xmlns="" xmlns:a14="http://schemas.microsoft.com/office/drawing/2010/main" w="9525">
                   <a:solidFill>
                     <a:schemeClr val="tx1"/>
                   </a:solidFill>
@@ -22255,7 +22047,7 @@
                 </a14:hiddenLine>
               </a:ext>
               <a:ext uri="{AF507438-7753-43E0-B8FC-AC1667EBCBE1}">
-                <a14:hiddenEffects xmlns:a14="http://schemas.microsoft.com/office/drawing/2010/main" xmlns="">
+                <a14:hiddenEffects xmlns="" xmlns:a14="http://schemas.microsoft.com/office/drawing/2010/main">
                   <a:effectLst>
                     <a:outerShdw dist="35921" dir="2700000" algn="ctr" rotWithShape="0">
                       <a:schemeClr val="bg2"/>
@@ -22278,7 +22070,7 @@
             <a:blip r:embed="rId7" cstate="print">
               <a:extLst>
                 <a:ext uri="{28A0092B-C50C-407E-A947-70E740481C1C}">
-                  <a14:useLocalDpi xmlns:a14="http://schemas.microsoft.com/office/drawing/2010/main" xmlns="" val="0"/>
+                  <a14:useLocalDpi xmlns="" xmlns:a14="http://schemas.microsoft.com/office/drawing/2010/main" val="0"/>
                 </a:ext>
               </a:extLst>
             </a:blip>
@@ -22298,7 +22090,7 @@
             <a:noFill/>
             <a:extLst>
               <a:ext uri="{909E8E84-426E-40DD-AFC4-6F175D3DCCD1}">
-                <a14:hiddenFill xmlns:a14="http://schemas.microsoft.com/office/drawing/2010/main" xmlns="">
+                <a14:hiddenFill xmlns="" xmlns:a14="http://schemas.microsoft.com/office/drawing/2010/main">
                   <a:solidFill>
                     <a:srgbClr val="FFFFFF"/>
                   </a:solidFill>
@@ -22624,7 +22416,7 @@
               <a:blip r:embed="rId8" cstate="print">
                 <a:extLst>
                   <a:ext uri="{BEBA8EAE-BF5A-486C-A8C5-ECC9F3942E4B}">
-                    <a14:imgProps xmlns:a14="http://schemas.microsoft.com/office/drawing/2010/main" xmlns="">
+                    <a14:imgProps xmlns="" xmlns:a14="http://schemas.microsoft.com/office/drawing/2010/main">
                       <a14:imgLayer r:embed="rId9">
                         <a14:imgEffect>
                           <a14:backgroundRemoval t="23750" b="79750" l="0" r="100000"/>
@@ -22633,7 +22425,7 @@
                     </a14:imgProps>
                   </a:ext>
                   <a:ext uri="{28A0092B-C50C-407E-A947-70E740481C1C}">
-                    <a14:useLocalDpi xmlns:a14="http://schemas.microsoft.com/office/drawing/2010/main" xmlns="" val="0"/>
+                    <a14:useLocalDpi xmlns="" xmlns:a14="http://schemas.microsoft.com/office/drawing/2010/main" val="0"/>
                   </a:ext>
                 </a:extLst>
               </a:blip>
@@ -22653,7 +22445,7 @@
               <a:noFill/>
               <a:extLst>
                 <a:ext uri="{909E8E84-426E-40DD-AFC4-6F175D3DCCD1}">
-                  <a14:hiddenFill xmlns:a14="http://schemas.microsoft.com/office/drawing/2010/main" xmlns="">
+                  <a14:hiddenFill xmlns="" xmlns:a14="http://schemas.microsoft.com/office/drawing/2010/main">
                     <a:solidFill>
                       <a:srgbClr val="FFFFFF"/>
                     </a:solidFill>
@@ -22674,7 +22466,7 @@
               <a:blip r:embed="rId10" cstate="print">
                 <a:extLst>
                   <a:ext uri="{28A0092B-C50C-407E-A947-70E740481C1C}">
-                    <a14:useLocalDpi xmlns:a14="http://schemas.microsoft.com/office/drawing/2010/main" xmlns="" val="0"/>
+                    <a14:useLocalDpi xmlns="" xmlns:a14="http://schemas.microsoft.com/office/drawing/2010/main" val="0"/>
                   </a:ext>
                 </a:extLst>
               </a:blip>
@@ -22698,14 +22490,14 @@
               <a:effectLst/>
               <a:extLst>
                 <a:ext uri="{909E8E84-426E-40DD-AFC4-6F175D3DCCD1}">
-                  <a14:hiddenFill xmlns:a14="http://schemas.microsoft.com/office/drawing/2010/main" xmlns="">
+                  <a14:hiddenFill xmlns="" xmlns:a14="http://schemas.microsoft.com/office/drawing/2010/main">
                     <a:solidFill>
                       <a:schemeClr val="accent1"/>
                     </a:solidFill>
                   </a14:hiddenFill>
                 </a:ext>
                 <a:ext uri="{91240B29-F687-4F45-9708-019B960494DF}">
-                  <a14:hiddenLine xmlns:a14="http://schemas.microsoft.com/office/drawing/2010/main" xmlns="" w="9525">
+                  <a14:hiddenLine xmlns="" xmlns:a14="http://schemas.microsoft.com/office/drawing/2010/main" w="9525">
                     <a:solidFill>
                       <a:schemeClr val="tx1"/>
                     </a:solidFill>
@@ -22715,7 +22507,7 @@
                   </a14:hiddenLine>
                 </a:ext>
                 <a:ext uri="{AF507438-7753-43E0-B8FC-AC1667EBCBE1}">
-                  <a14:hiddenEffects xmlns:a14="http://schemas.microsoft.com/office/drawing/2010/main" xmlns="">
+                  <a14:hiddenEffects xmlns="" xmlns:a14="http://schemas.microsoft.com/office/drawing/2010/main">
                     <a:effectLst>
                       <a:outerShdw dist="35921" dir="2700000" algn="ctr" rotWithShape="0">
                         <a:schemeClr val="bg2"/>
@@ -22738,7 +22530,7 @@
               <a:blip r:embed="rId11" cstate="print">
                 <a:extLst>
                   <a:ext uri="{28A0092B-C50C-407E-A947-70E740481C1C}">
-                    <a14:useLocalDpi xmlns:a14="http://schemas.microsoft.com/office/drawing/2010/main" xmlns="" val="0"/>
+                    <a14:useLocalDpi xmlns="" xmlns:a14="http://schemas.microsoft.com/office/drawing/2010/main" val="0"/>
                   </a:ext>
                 </a:extLst>
               </a:blip>
@@ -22762,14 +22554,14 @@
               <a:effectLst/>
               <a:extLst>
                 <a:ext uri="{909E8E84-426E-40DD-AFC4-6F175D3DCCD1}">
-                  <a14:hiddenFill xmlns:a14="http://schemas.microsoft.com/office/drawing/2010/main" xmlns="">
+                  <a14:hiddenFill xmlns="" xmlns:a14="http://schemas.microsoft.com/office/drawing/2010/main">
                     <a:solidFill>
                       <a:schemeClr val="accent1"/>
                     </a:solidFill>
                   </a14:hiddenFill>
                 </a:ext>
                 <a:ext uri="{91240B29-F687-4F45-9708-019B960494DF}">
-                  <a14:hiddenLine xmlns:a14="http://schemas.microsoft.com/office/drawing/2010/main" xmlns="" w="9525">
+                  <a14:hiddenLine xmlns="" xmlns:a14="http://schemas.microsoft.com/office/drawing/2010/main" w="9525">
                     <a:solidFill>
                       <a:schemeClr val="tx1"/>
                     </a:solidFill>
@@ -22779,7 +22571,7 @@
                   </a14:hiddenLine>
                 </a:ext>
                 <a:ext uri="{AF507438-7753-43E0-B8FC-AC1667EBCBE1}">
-                  <a14:hiddenEffects xmlns:a14="http://schemas.microsoft.com/office/drawing/2010/main" xmlns="">
+                  <a14:hiddenEffects xmlns="" xmlns:a14="http://schemas.microsoft.com/office/drawing/2010/main">
                     <a:effectLst>
                       <a:outerShdw dist="35921" dir="2700000" algn="ctr" rotWithShape="0">
                         <a:schemeClr val="bg2"/>
@@ -22802,7 +22594,7 @@
               <a:blip r:embed="rId12" cstate="print">
                 <a:extLst>
                   <a:ext uri="{28A0092B-C50C-407E-A947-70E740481C1C}">
-                    <a14:useLocalDpi xmlns:a14="http://schemas.microsoft.com/office/drawing/2010/main" xmlns="" val="0"/>
+                    <a14:useLocalDpi xmlns="" xmlns:a14="http://schemas.microsoft.com/office/drawing/2010/main" val="0"/>
                   </a:ext>
                 </a:extLst>
               </a:blip>
@@ -22822,7 +22614,7 @@
               <a:noFill/>
               <a:extLst>
                 <a:ext uri="{909E8E84-426E-40DD-AFC4-6F175D3DCCD1}">
-                  <a14:hiddenFill xmlns:a14="http://schemas.microsoft.com/office/drawing/2010/main" xmlns="">
+                  <a14:hiddenFill xmlns="" xmlns:a14="http://schemas.microsoft.com/office/drawing/2010/main">
                     <a:solidFill>
                       <a:srgbClr val="FFFFFF"/>
                     </a:solidFill>
@@ -22843,7 +22635,7 @@
               <a:blip r:embed="rId13" cstate="print">
                 <a:extLst>
                   <a:ext uri="{28A0092B-C50C-407E-A947-70E740481C1C}">
-                    <a14:useLocalDpi xmlns:a14="http://schemas.microsoft.com/office/drawing/2010/main" xmlns="" val="0"/>
+                    <a14:useLocalDpi xmlns="" xmlns:a14="http://schemas.microsoft.com/office/drawing/2010/main" val="0"/>
                   </a:ext>
                 </a:extLst>
               </a:blip>
@@ -22863,7 +22655,7 @@
               <a:noFill/>
               <a:extLst>
                 <a:ext uri="{909E8E84-426E-40DD-AFC4-6F175D3DCCD1}">
-                  <a14:hiddenFill xmlns:a14="http://schemas.microsoft.com/office/drawing/2010/main" xmlns="">
+                  <a14:hiddenFill xmlns="" xmlns:a14="http://schemas.microsoft.com/office/drawing/2010/main">
                     <a:solidFill>
                       <a:srgbClr val="FFFFFF"/>
                     </a:solidFill>
@@ -22969,21 +22761,8 @@
                 <a:ea typeface="Tahoma" pitchFamily="34" charset="0"/>
                 <a:cs typeface="Tahoma" pitchFamily="34" charset="0"/>
               </a:rPr>
-              <a:t>(Power Sourcing Equipment – </a:t>
-            </a:r>
-            <a:r>
-              <a:rPr lang="en-US" sz="2400" kern="0" dirty="0" smtClean="0">
-                <a:latin typeface="Tahoma" pitchFamily="34" charset="0"/>
-                <a:ea typeface="Tahoma" pitchFamily="34" charset="0"/>
-                <a:cs typeface="Tahoma" pitchFamily="34" charset="0"/>
-              </a:rPr>
-              <a:t>PSE )</a:t>
-            </a:r>
-            <a:endParaRPr lang="en-US" sz="2400" kern="0" dirty="0" smtClean="0">
-              <a:latin typeface="Tahoma" pitchFamily="34" charset="0"/>
-              <a:ea typeface="Tahoma" pitchFamily="34" charset="0"/>
-              <a:cs typeface="Tahoma" pitchFamily="34" charset="0"/>
-            </a:endParaRPr>
+              <a:t>(Power Sourcing Equipment – PSE )</a:t>
+            </a:r>
           </a:p>
         </p:txBody>
       </p:sp>
@@ -23056,7 +22835,7 @@
     </p:spTree>
     <p:extLst>
       <p:ext uri="{BB962C8B-B14F-4D97-AF65-F5344CB8AC3E}">
-        <p14:creationId xmlns:p14="http://schemas.microsoft.com/office/powerpoint/2010/main" xmlns="" val="2562191847"/>
+        <p14:creationId xmlns="" xmlns:p14="http://schemas.microsoft.com/office/powerpoint/2010/main" val="2562191847"/>
       </p:ext>
     </p:extLst>
   </p:cSld>
@@ -23228,7 +23007,15 @@
                 <a:ea typeface="Tahoma" pitchFamily="34" charset="0"/>
                 <a:cs typeface="Tahoma" pitchFamily="34" charset="0"/>
               </a:rPr>
-              <a:t> um </a:t>
+              <a:t> um PSE (switch </a:t>
+            </a:r>
+            <a:r>
+              <a:rPr lang="en-US" sz="2000" dirty="0" err="1" smtClean="0">
+                <a:latin typeface="Tahoma" pitchFamily="34" charset="0"/>
+                <a:ea typeface="Tahoma" pitchFamily="34" charset="0"/>
+                <a:cs typeface="Tahoma" pitchFamily="34" charset="0"/>
+              </a:rPr>
+              <a:t>ou</a:t>
             </a:r>
             <a:r>
               <a:rPr lang="en-US" sz="2000" dirty="0" smtClean="0">
@@ -23236,7 +23023,7 @@
                 <a:ea typeface="Tahoma" pitchFamily="34" charset="0"/>
                 <a:cs typeface="Tahoma" pitchFamily="34" charset="0"/>
               </a:rPr>
-              <a:t>PSE (switch </a:t>
+              <a:t> </a:t>
             </a:r>
             <a:r>
               <a:rPr lang="en-US" sz="2000" dirty="0" err="1" smtClean="0">
@@ -23244,6 +23031,150 @@
                 <a:ea typeface="Tahoma" pitchFamily="34" charset="0"/>
                 <a:cs typeface="Tahoma" pitchFamily="34" charset="0"/>
               </a:rPr>
+              <a:t>injetor</a:t>
+            </a:r>
+            <a:r>
+              <a:rPr lang="en-US" sz="2000" dirty="0" smtClean="0">
+                <a:latin typeface="Tahoma" pitchFamily="34" charset="0"/>
+                <a:ea typeface="Tahoma" pitchFamily="34" charset="0"/>
+                <a:cs typeface="Tahoma" pitchFamily="34" charset="0"/>
+              </a:rPr>
+              <a:t>) é </a:t>
+            </a:r>
+            <a:r>
+              <a:rPr lang="en-US" sz="2000" dirty="0" err="1" smtClean="0">
+                <a:latin typeface="Tahoma" pitchFamily="34" charset="0"/>
+                <a:ea typeface="Tahoma" pitchFamily="34" charset="0"/>
+                <a:cs typeface="Tahoma" pitchFamily="34" charset="0"/>
+              </a:rPr>
+              <a:t>ligado</a:t>
+            </a:r>
+            <a:r>
+              <a:rPr lang="en-US" sz="2000" dirty="0" smtClean="0">
+                <a:latin typeface="Tahoma" pitchFamily="34" charset="0"/>
+                <a:ea typeface="Tahoma" pitchFamily="34" charset="0"/>
+                <a:cs typeface="Tahoma" pitchFamily="34" charset="0"/>
+              </a:rPr>
+              <a:t>, </a:t>
+            </a:r>
+            <a:r>
+              <a:rPr lang="en-US" sz="2000" dirty="0" err="1" smtClean="0">
+                <a:latin typeface="Tahoma" pitchFamily="34" charset="0"/>
+                <a:ea typeface="Tahoma" pitchFamily="34" charset="0"/>
+                <a:cs typeface="Tahoma" pitchFamily="34" charset="0"/>
+              </a:rPr>
+              <a:t>ele</a:t>
+            </a:r>
+            <a:r>
+              <a:rPr lang="en-US" sz="2000" dirty="0" smtClean="0">
+                <a:latin typeface="Tahoma" pitchFamily="34" charset="0"/>
+                <a:ea typeface="Tahoma" pitchFamily="34" charset="0"/>
+                <a:cs typeface="Tahoma" pitchFamily="34" charset="0"/>
+              </a:rPr>
+              <a:t> </a:t>
+            </a:r>
+            <a:r>
+              <a:rPr lang="en-US" sz="2000" dirty="0" err="1" smtClean="0">
+                <a:latin typeface="Tahoma" pitchFamily="34" charset="0"/>
+                <a:ea typeface="Tahoma" pitchFamily="34" charset="0"/>
+                <a:cs typeface="Tahoma" pitchFamily="34" charset="0"/>
+              </a:rPr>
+              <a:t>detecta</a:t>
+            </a:r>
+            <a:r>
+              <a:rPr lang="en-US" sz="2000" dirty="0" smtClean="0">
+                <a:latin typeface="Tahoma" pitchFamily="34" charset="0"/>
+                <a:ea typeface="Tahoma" pitchFamily="34" charset="0"/>
+                <a:cs typeface="Tahoma" pitchFamily="34" charset="0"/>
+              </a:rPr>
+              <a:t> se </a:t>
+            </a:r>
+            <a:r>
+              <a:rPr lang="en-US" sz="2000" dirty="0" err="1" smtClean="0">
+                <a:latin typeface="Tahoma" pitchFamily="34" charset="0"/>
+                <a:ea typeface="Tahoma" pitchFamily="34" charset="0"/>
+                <a:cs typeface="Tahoma" pitchFamily="34" charset="0"/>
+              </a:rPr>
+              <a:t>os</a:t>
+            </a:r>
+            <a:r>
+              <a:rPr lang="en-US" sz="2000" dirty="0" smtClean="0">
+                <a:latin typeface="Tahoma" pitchFamily="34" charset="0"/>
+                <a:ea typeface="Tahoma" pitchFamily="34" charset="0"/>
+                <a:cs typeface="Tahoma" pitchFamily="34" charset="0"/>
+              </a:rPr>
+              <a:t> </a:t>
+            </a:r>
+            <a:r>
+              <a:rPr lang="en-US" sz="2000" dirty="0" err="1" smtClean="0">
+                <a:latin typeface="Tahoma" pitchFamily="34" charset="0"/>
+                <a:ea typeface="Tahoma" pitchFamily="34" charset="0"/>
+                <a:cs typeface="Tahoma" pitchFamily="34" charset="0"/>
+              </a:rPr>
+              <a:t>dispositivos</a:t>
+            </a:r>
+            <a:r>
+              <a:rPr lang="en-US" sz="2000" dirty="0" smtClean="0">
+                <a:latin typeface="Tahoma" pitchFamily="34" charset="0"/>
+                <a:ea typeface="Tahoma" pitchFamily="34" charset="0"/>
+                <a:cs typeface="Tahoma" pitchFamily="34" charset="0"/>
+              </a:rPr>
+              <a:t>  a </a:t>
+            </a:r>
+            <a:r>
+              <a:rPr lang="en-US" sz="2000" dirty="0" err="1" smtClean="0">
+                <a:latin typeface="Tahoma" pitchFamily="34" charset="0"/>
+                <a:ea typeface="Tahoma" pitchFamily="34" charset="0"/>
+                <a:cs typeface="Tahoma" pitchFamily="34" charset="0"/>
+              </a:rPr>
+              <a:t>ele</a:t>
+            </a:r>
+            <a:r>
+              <a:rPr lang="en-US" sz="2000" dirty="0" smtClean="0">
+                <a:latin typeface="Tahoma" pitchFamily="34" charset="0"/>
+                <a:ea typeface="Tahoma" pitchFamily="34" charset="0"/>
+                <a:cs typeface="Tahoma" pitchFamily="34" charset="0"/>
+              </a:rPr>
+              <a:t> </a:t>
+            </a:r>
+            <a:r>
+              <a:rPr lang="en-US" sz="2000" dirty="0" err="1" smtClean="0">
+                <a:latin typeface="Tahoma" pitchFamily="34" charset="0"/>
+                <a:ea typeface="Tahoma" pitchFamily="34" charset="0"/>
+                <a:cs typeface="Tahoma" pitchFamily="34" charset="0"/>
+              </a:rPr>
+              <a:t>conectados</a:t>
+            </a:r>
+            <a:r>
+              <a:rPr lang="en-US" sz="2000" dirty="0" smtClean="0">
+                <a:latin typeface="Tahoma" pitchFamily="34" charset="0"/>
+                <a:ea typeface="Tahoma" pitchFamily="34" charset="0"/>
+                <a:cs typeface="Tahoma" pitchFamily="34" charset="0"/>
+              </a:rPr>
+              <a:t> (PD) </a:t>
+            </a:r>
+            <a:r>
+              <a:rPr lang="en-US" sz="2000" dirty="0" err="1" smtClean="0">
+                <a:latin typeface="Tahoma" pitchFamily="34" charset="0"/>
+                <a:ea typeface="Tahoma" pitchFamily="34" charset="0"/>
+                <a:cs typeface="Tahoma" pitchFamily="34" charset="0"/>
+              </a:rPr>
+              <a:t>são</a:t>
+            </a:r>
+            <a:r>
+              <a:rPr lang="en-US" sz="2000" dirty="0" smtClean="0">
+                <a:latin typeface="Tahoma" pitchFamily="34" charset="0"/>
+                <a:ea typeface="Tahoma" pitchFamily="34" charset="0"/>
+                <a:cs typeface="Tahoma" pitchFamily="34" charset="0"/>
+              </a:rPr>
+              <a:t> </a:t>
+            </a:r>
+            <a:r>
+              <a:rPr lang="en-US" sz="2000" dirty="0" err="1" smtClean="0">
+                <a:latin typeface="Tahoma" pitchFamily="34" charset="0"/>
+                <a:ea typeface="Tahoma" pitchFamily="34" charset="0"/>
+                <a:cs typeface="Tahoma" pitchFamily="34" charset="0"/>
+              </a:rPr>
               <a:t>ou</a:t>
             </a:r>
             <a:r>
@@ -23260,7 +23191,7 @@
                 <a:ea typeface="Tahoma" pitchFamily="34" charset="0"/>
                 <a:cs typeface="Tahoma" pitchFamily="34" charset="0"/>
               </a:rPr>
-              <a:t>injetor</a:t>
+              <a:t>não</a:t>
             </a:r>
             <a:r>
               <a:rPr lang="en-US" sz="2000" dirty="0" smtClean="0">
@@ -23268,7 +23199,7 @@
                 <a:ea typeface="Tahoma" pitchFamily="34" charset="0"/>
                 <a:cs typeface="Tahoma" pitchFamily="34" charset="0"/>
               </a:rPr>
-              <a:t>) é </a:t>
+              <a:t> </a:t>
             </a:r>
             <a:r>
               <a:rPr lang="en-US" sz="2000" dirty="0" err="1" smtClean="0">
@@ -23276,7 +23207,7 @@
                 <a:ea typeface="Tahoma" pitchFamily="34" charset="0"/>
                 <a:cs typeface="Tahoma" pitchFamily="34" charset="0"/>
               </a:rPr>
-              <a:t>ligado</a:t>
+              <a:t>compatíveis</a:t>
             </a:r>
             <a:r>
               <a:rPr lang="en-US" sz="2000" dirty="0" smtClean="0">
@@ -23284,175 +23215,7 @@
                 <a:ea typeface="Tahoma" pitchFamily="34" charset="0"/>
                 <a:cs typeface="Tahoma" pitchFamily="34" charset="0"/>
               </a:rPr>
-              <a:t>, </a:t>
-            </a:r>
-            <a:r>
-              <a:rPr lang="en-US" sz="2000" dirty="0" err="1" smtClean="0">
-                <a:latin typeface="Tahoma" pitchFamily="34" charset="0"/>
-                <a:ea typeface="Tahoma" pitchFamily="34" charset="0"/>
-                <a:cs typeface="Tahoma" pitchFamily="34" charset="0"/>
-              </a:rPr>
-              <a:t>ele</a:t>
-            </a:r>
-            <a:r>
-              <a:rPr lang="en-US" sz="2000" dirty="0" smtClean="0">
-                <a:latin typeface="Tahoma" pitchFamily="34" charset="0"/>
-                <a:ea typeface="Tahoma" pitchFamily="34" charset="0"/>
-                <a:cs typeface="Tahoma" pitchFamily="34" charset="0"/>
-              </a:rPr>
-              <a:t> </a:t>
-            </a:r>
-            <a:r>
-              <a:rPr lang="en-US" sz="2000" dirty="0" err="1" smtClean="0">
-                <a:latin typeface="Tahoma" pitchFamily="34" charset="0"/>
-                <a:ea typeface="Tahoma" pitchFamily="34" charset="0"/>
-                <a:cs typeface="Tahoma" pitchFamily="34" charset="0"/>
-              </a:rPr>
-              <a:t>detecta</a:t>
-            </a:r>
-            <a:r>
-              <a:rPr lang="en-US" sz="2000" dirty="0" smtClean="0">
-                <a:latin typeface="Tahoma" pitchFamily="34" charset="0"/>
-                <a:ea typeface="Tahoma" pitchFamily="34" charset="0"/>
-                <a:cs typeface="Tahoma" pitchFamily="34" charset="0"/>
-              </a:rPr>
-              <a:t> se </a:t>
-            </a:r>
-            <a:r>
-              <a:rPr lang="en-US" sz="2000" dirty="0" err="1" smtClean="0">
-                <a:latin typeface="Tahoma" pitchFamily="34" charset="0"/>
-                <a:ea typeface="Tahoma" pitchFamily="34" charset="0"/>
-                <a:cs typeface="Tahoma" pitchFamily="34" charset="0"/>
-              </a:rPr>
-              <a:t>os</a:t>
-            </a:r>
-            <a:r>
-              <a:rPr lang="en-US" sz="2000" dirty="0" smtClean="0">
-                <a:latin typeface="Tahoma" pitchFamily="34" charset="0"/>
-                <a:ea typeface="Tahoma" pitchFamily="34" charset="0"/>
-                <a:cs typeface="Tahoma" pitchFamily="34" charset="0"/>
-              </a:rPr>
-              <a:t> </a:t>
-            </a:r>
-            <a:r>
-              <a:rPr lang="en-US" sz="2000" dirty="0" err="1" smtClean="0">
-                <a:latin typeface="Tahoma" pitchFamily="34" charset="0"/>
-                <a:ea typeface="Tahoma" pitchFamily="34" charset="0"/>
-                <a:cs typeface="Tahoma" pitchFamily="34" charset="0"/>
-              </a:rPr>
-              <a:t>dispositivos</a:t>
-            </a:r>
-            <a:r>
-              <a:rPr lang="en-US" sz="2000" dirty="0" smtClean="0">
-                <a:latin typeface="Tahoma" pitchFamily="34" charset="0"/>
-                <a:ea typeface="Tahoma" pitchFamily="34" charset="0"/>
-                <a:cs typeface="Tahoma" pitchFamily="34" charset="0"/>
-              </a:rPr>
-              <a:t>  a </a:t>
-            </a:r>
-            <a:r>
-              <a:rPr lang="en-US" sz="2000" dirty="0" err="1" smtClean="0">
-                <a:latin typeface="Tahoma" pitchFamily="34" charset="0"/>
-                <a:ea typeface="Tahoma" pitchFamily="34" charset="0"/>
-                <a:cs typeface="Tahoma" pitchFamily="34" charset="0"/>
-              </a:rPr>
-              <a:t>ele</a:t>
-            </a:r>
-            <a:r>
-              <a:rPr lang="en-US" sz="2000" dirty="0" smtClean="0">
-                <a:latin typeface="Tahoma" pitchFamily="34" charset="0"/>
-                <a:ea typeface="Tahoma" pitchFamily="34" charset="0"/>
-                <a:cs typeface="Tahoma" pitchFamily="34" charset="0"/>
-              </a:rPr>
-              <a:t> </a:t>
-            </a:r>
-            <a:r>
-              <a:rPr lang="en-US" sz="2000" dirty="0" err="1" smtClean="0">
-                <a:latin typeface="Tahoma" pitchFamily="34" charset="0"/>
-                <a:ea typeface="Tahoma" pitchFamily="34" charset="0"/>
-                <a:cs typeface="Tahoma" pitchFamily="34" charset="0"/>
-              </a:rPr>
-              <a:t>conectados</a:t>
-            </a:r>
-            <a:r>
-              <a:rPr lang="en-US" sz="2000" dirty="0" smtClean="0">
-                <a:latin typeface="Tahoma" pitchFamily="34" charset="0"/>
-                <a:ea typeface="Tahoma" pitchFamily="34" charset="0"/>
-                <a:cs typeface="Tahoma" pitchFamily="34" charset="0"/>
-              </a:rPr>
-              <a:t> (PD) </a:t>
-            </a:r>
-            <a:r>
-              <a:rPr lang="en-US" sz="2000" dirty="0" err="1" smtClean="0">
-                <a:latin typeface="Tahoma" pitchFamily="34" charset="0"/>
-                <a:ea typeface="Tahoma" pitchFamily="34" charset="0"/>
-                <a:cs typeface="Tahoma" pitchFamily="34" charset="0"/>
-              </a:rPr>
-              <a:t>são</a:t>
-            </a:r>
-            <a:r>
-              <a:rPr lang="en-US" sz="2000" dirty="0" smtClean="0">
-                <a:latin typeface="Tahoma" pitchFamily="34" charset="0"/>
-                <a:ea typeface="Tahoma" pitchFamily="34" charset="0"/>
-                <a:cs typeface="Tahoma" pitchFamily="34" charset="0"/>
-              </a:rPr>
-              <a:t> </a:t>
-            </a:r>
-            <a:r>
-              <a:rPr lang="en-US" sz="2000" dirty="0" err="1" smtClean="0">
-                <a:latin typeface="Tahoma" pitchFamily="34" charset="0"/>
-                <a:ea typeface="Tahoma" pitchFamily="34" charset="0"/>
-                <a:cs typeface="Tahoma" pitchFamily="34" charset="0"/>
-              </a:rPr>
-              <a:t>ou</a:t>
-            </a:r>
-            <a:r>
-              <a:rPr lang="en-US" sz="2000" dirty="0" smtClean="0">
-                <a:latin typeface="Tahoma" pitchFamily="34" charset="0"/>
-                <a:ea typeface="Tahoma" pitchFamily="34" charset="0"/>
-                <a:cs typeface="Tahoma" pitchFamily="34" charset="0"/>
-              </a:rPr>
-              <a:t> </a:t>
-            </a:r>
-            <a:r>
-              <a:rPr lang="en-US" sz="2000" dirty="0" err="1" smtClean="0">
-                <a:latin typeface="Tahoma" pitchFamily="34" charset="0"/>
-                <a:ea typeface="Tahoma" pitchFamily="34" charset="0"/>
-                <a:cs typeface="Tahoma" pitchFamily="34" charset="0"/>
-              </a:rPr>
-              <a:t>não</a:t>
-            </a:r>
-            <a:r>
-              <a:rPr lang="en-US" sz="2000" dirty="0" smtClean="0">
-                <a:latin typeface="Tahoma" pitchFamily="34" charset="0"/>
-                <a:ea typeface="Tahoma" pitchFamily="34" charset="0"/>
-                <a:cs typeface="Tahoma" pitchFamily="34" charset="0"/>
-              </a:rPr>
-              <a:t> </a:t>
-            </a:r>
-            <a:r>
-              <a:rPr lang="en-US" sz="2000" dirty="0" err="1" smtClean="0">
-                <a:latin typeface="Tahoma" pitchFamily="34" charset="0"/>
-                <a:ea typeface="Tahoma" pitchFamily="34" charset="0"/>
-                <a:cs typeface="Tahoma" pitchFamily="34" charset="0"/>
-              </a:rPr>
-              <a:t>compatíveis</a:t>
-            </a:r>
-            <a:r>
-              <a:rPr lang="en-US" sz="2000" dirty="0" smtClean="0">
-                <a:latin typeface="Tahoma" pitchFamily="34" charset="0"/>
-                <a:ea typeface="Tahoma" pitchFamily="34" charset="0"/>
-                <a:cs typeface="Tahoma" pitchFamily="34" charset="0"/>
-              </a:rPr>
-              <a:t> </a:t>
-            </a:r>
-            <a:r>
-              <a:rPr lang="en-US" sz="2000" dirty="0" smtClean="0">
-                <a:latin typeface="Tahoma" pitchFamily="34" charset="0"/>
-                <a:ea typeface="Tahoma" pitchFamily="34" charset="0"/>
-                <a:cs typeface="Tahoma" pitchFamily="34" charset="0"/>
-              </a:rPr>
-              <a:t>com PoE:</a:t>
+              <a:t> com PoE:</a:t>
             </a:r>
           </a:p>
           <a:p>
@@ -23586,15 +23349,39 @@
                 <a:ea typeface="Tahoma" pitchFamily="34" charset="0"/>
                 <a:cs typeface="Tahoma" pitchFamily="34" charset="0"/>
               </a:rPr>
+              <a:t> a </a:t>
+            </a:r>
+            <a:r>
+              <a:rPr lang="en-US" sz="2000" dirty="0" err="1" smtClean="0">
+                <a:latin typeface="Tahoma" pitchFamily="34" charset="0"/>
+                <a:ea typeface="Tahoma" pitchFamily="34" charset="0"/>
+                <a:cs typeface="Tahoma" pitchFamily="34" charset="0"/>
+              </a:rPr>
+              <a:t>energia</a:t>
+            </a:r>
+            <a:r>
+              <a:rPr lang="en-US" sz="2000" dirty="0" smtClean="0">
+                <a:latin typeface="Tahoma" pitchFamily="34" charset="0"/>
+                <a:ea typeface="Tahoma" pitchFamily="34" charset="0"/>
+                <a:cs typeface="Tahoma" pitchFamily="34" charset="0"/>
+              </a:rPr>
               <a:t> </a:t>
             </a:r>
             <a:r>
+              <a:rPr lang="en-US" sz="2000" dirty="0" err="1" smtClean="0">
+                <a:latin typeface="Tahoma" pitchFamily="34" charset="0"/>
+                <a:ea typeface="Tahoma" pitchFamily="34" charset="0"/>
+                <a:cs typeface="Tahoma" pitchFamily="34" charset="0"/>
+              </a:rPr>
+              <a:t>adequada</a:t>
+            </a:r>
+            <a:r>
               <a:rPr lang="en-US" sz="2000" dirty="0" smtClean="0">
                 <a:latin typeface="Tahoma" pitchFamily="34" charset="0"/>
                 <a:ea typeface="Tahoma" pitchFamily="34" charset="0"/>
                 <a:cs typeface="Tahoma" pitchFamily="34" charset="0"/>
               </a:rPr>
-              <a:t>a </a:t>
+              <a:t> </a:t>
             </a:r>
             <a:r>
               <a:rPr lang="en-US" sz="2000" dirty="0" err="1" smtClean="0">
@@ -23602,7 +23389,7 @@
                 <a:ea typeface="Tahoma" pitchFamily="34" charset="0"/>
                 <a:cs typeface="Tahoma" pitchFamily="34" charset="0"/>
               </a:rPr>
-              <a:t>energia</a:t>
+              <a:t>para</a:t>
             </a:r>
             <a:r>
               <a:rPr lang="en-US" sz="2000" dirty="0" smtClean="0">
@@ -23618,7 +23405,7 @@
                 <a:ea typeface="Tahoma" pitchFamily="34" charset="0"/>
                 <a:cs typeface="Tahoma" pitchFamily="34" charset="0"/>
               </a:rPr>
-              <a:t>adequada</a:t>
+              <a:t>sua</a:t>
             </a:r>
             <a:r>
               <a:rPr lang="en-US" sz="2000" dirty="0" smtClean="0">
@@ -23634,7 +23421,7 @@
                 <a:ea typeface="Tahoma" pitchFamily="34" charset="0"/>
                 <a:cs typeface="Tahoma" pitchFamily="34" charset="0"/>
               </a:rPr>
-              <a:t>para</a:t>
+              <a:t>alimentação</a:t>
             </a:r>
             <a:r>
               <a:rPr lang="en-US" sz="2000" dirty="0" smtClean="0">
@@ -23642,6 +23429,38 @@
                 <a:ea typeface="Tahoma" pitchFamily="34" charset="0"/>
                 <a:cs typeface="Tahoma" pitchFamily="34" charset="0"/>
               </a:rPr>
+              <a:t> (15,4 W </a:t>
+            </a:r>
+            <a:r>
+              <a:rPr lang="en-US" sz="2000" dirty="0" err="1" smtClean="0">
+                <a:latin typeface="Tahoma" pitchFamily="34" charset="0"/>
+                <a:ea typeface="Tahoma" pitchFamily="34" charset="0"/>
+                <a:cs typeface="Tahoma" pitchFamily="34" charset="0"/>
+              </a:rPr>
+              <a:t>ou</a:t>
+            </a:r>
+            <a:r>
+              <a:rPr lang="en-US" sz="2000" dirty="0" smtClean="0">
+                <a:latin typeface="Tahoma" pitchFamily="34" charset="0"/>
+                <a:ea typeface="Tahoma" pitchFamily="34" charset="0"/>
+                <a:cs typeface="Tahoma" pitchFamily="34" charset="0"/>
+              </a:rPr>
+              <a:t> 32,4 W) é </a:t>
+            </a:r>
+            <a:r>
+              <a:rPr lang="en-US" sz="2000" dirty="0" err="1" smtClean="0">
+                <a:latin typeface="Tahoma" pitchFamily="34" charset="0"/>
+                <a:ea typeface="Tahoma" pitchFamily="34" charset="0"/>
+                <a:cs typeface="Tahoma" pitchFamily="34" charset="0"/>
+              </a:rPr>
+              <a:t>fornecida</a:t>
+            </a:r>
+            <a:r>
+              <a:rPr lang="en-US" sz="2000" dirty="0" smtClean="0">
+                <a:latin typeface="Tahoma" pitchFamily="34" charset="0"/>
+                <a:ea typeface="Tahoma" pitchFamily="34" charset="0"/>
+                <a:cs typeface="Tahoma" pitchFamily="34" charset="0"/>
+              </a:rPr>
               <a:t> </a:t>
             </a:r>
             <a:r>
@@ -23650,7 +23469,7 @@
                 <a:ea typeface="Tahoma" pitchFamily="34" charset="0"/>
                 <a:cs typeface="Tahoma" pitchFamily="34" charset="0"/>
               </a:rPr>
-              <a:t>sua</a:t>
+              <a:t>pelo</a:t>
             </a:r>
             <a:r>
               <a:rPr lang="en-US" sz="2000" dirty="0" smtClean="0">
@@ -23658,85 +23477,8 @@
                 <a:ea typeface="Tahoma" pitchFamily="34" charset="0"/>
                 <a:cs typeface="Tahoma" pitchFamily="34" charset="0"/>
               </a:rPr>
-              <a:t> </a:t>
-            </a:r>
-            <a:r>
-              <a:rPr lang="en-US" sz="2000" dirty="0" err="1" smtClean="0">
-                <a:latin typeface="Tahoma" pitchFamily="34" charset="0"/>
-                <a:ea typeface="Tahoma" pitchFamily="34" charset="0"/>
-                <a:cs typeface="Tahoma" pitchFamily="34" charset="0"/>
-              </a:rPr>
-              <a:t>alimentação</a:t>
-            </a:r>
-            <a:r>
-              <a:rPr lang="en-US" sz="2000" dirty="0" smtClean="0">
-                <a:latin typeface="Tahoma" pitchFamily="34" charset="0"/>
-                <a:ea typeface="Tahoma" pitchFamily="34" charset="0"/>
-                <a:cs typeface="Tahoma" pitchFamily="34" charset="0"/>
-              </a:rPr>
-              <a:t> (15,4 W </a:t>
-            </a:r>
-            <a:r>
-              <a:rPr lang="en-US" sz="2000" dirty="0" err="1" smtClean="0">
-                <a:latin typeface="Tahoma" pitchFamily="34" charset="0"/>
-                <a:ea typeface="Tahoma" pitchFamily="34" charset="0"/>
-                <a:cs typeface="Tahoma" pitchFamily="34" charset="0"/>
-              </a:rPr>
-              <a:t>ou</a:t>
-            </a:r>
-            <a:r>
-              <a:rPr lang="en-US" sz="2000" dirty="0" smtClean="0">
-                <a:latin typeface="Tahoma" pitchFamily="34" charset="0"/>
-                <a:ea typeface="Tahoma" pitchFamily="34" charset="0"/>
-                <a:cs typeface="Tahoma" pitchFamily="34" charset="0"/>
-              </a:rPr>
-              <a:t> 32,4 W) </a:t>
-            </a:r>
-            <a:r>
-              <a:rPr lang="en-US" sz="2000" dirty="0" smtClean="0">
-                <a:latin typeface="Tahoma" pitchFamily="34" charset="0"/>
-                <a:ea typeface="Tahoma" pitchFamily="34" charset="0"/>
-                <a:cs typeface="Tahoma" pitchFamily="34" charset="0"/>
-              </a:rPr>
-              <a:t>é </a:t>
-            </a:r>
-            <a:r>
-              <a:rPr lang="en-US" sz="2000" dirty="0" err="1" smtClean="0">
-                <a:latin typeface="Tahoma" pitchFamily="34" charset="0"/>
-                <a:ea typeface="Tahoma" pitchFamily="34" charset="0"/>
-                <a:cs typeface="Tahoma" pitchFamily="34" charset="0"/>
-              </a:rPr>
-              <a:t>fornecida</a:t>
-            </a:r>
-            <a:r>
-              <a:rPr lang="en-US" sz="2000" dirty="0" smtClean="0">
-                <a:latin typeface="Tahoma" pitchFamily="34" charset="0"/>
-                <a:ea typeface="Tahoma" pitchFamily="34" charset="0"/>
-                <a:cs typeface="Tahoma" pitchFamily="34" charset="0"/>
-              </a:rPr>
-              <a:t> </a:t>
-            </a:r>
-            <a:r>
-              <a:rPr lang="en-US" sz="2000" dirty="0" err="1" smtClean="0">
-                <a:latin typeface="Tahoma" pitchFamily="34" charset="0"/>
-                <a:ea typeface="Tahoma" pitchFamily="34" charset="0"/>
-                <a:cs typeface="Tahoma" pitchFamily="34" charset="0"/>
-              </a:rPr>
-              <a:t>pelo</a:t>
-            </a:r>
-            <a:r>
-              <a:rPr lang="en-US" sz="2000" dirty="0" smtClean="0">
-                <a:latin typeface="Tahoma" pitchFamily="34" charset="0"/>
-                <a:ea typeface="Tahoma" pitchFamily="34" charset="0"/>
-                <a:cs typeface="Tahoma" pitchFamily="34" charset="0"/>
-              </a:rPr>
               <a:t> PSE.</a:t>
             </a:r>
-            <a:endParaRPr lang="en-US" sz="2000" dirty="0" smtClean="0">
-              <a:latin typeface="Tahoma" pitchFamily="34" charset="0"/>
-              <a:ea typeface="Tahoma" pitchFamily="34" charset="0"/>
-              <a:cs typeface="Tahoma" pitchFamily="34" charset="0"/>
-            </a:endParaRPr>
           </a:p>
           <a:p>
             <a:pPr marL="800100" lvl="2" indent="0">
@@ -24005,15 +23747,7 @@
                 <a:ea typeface="Tahoma" pitchFamily="34" charset="0"/>
                 <a:cs typeface="Tahoma" pitchFamily="34" charset="0"/>
               </a:rPr>
-              <a:t> </a:t>
-            </a:r>
-            <a:r>
-              <a:rPr lang="en-US" sz="2000" dirty="0" smtClean="0">
-                <a:latin typeface="Tahoma" pitchFamily="34" charset="0"/>
-                <a:ea typeface="Tahoma" pitchFamily="34" charset="0"/>
-                <a:cs typeface="Tahoma" pitchFamily="34" charset="0"/>
-              </a:rPr>
-              <a:t>a </a:t>
+              <a:t> a </a:t>
             </a:r>
             <a:r>
               <a:rPr lang="en-US" sz="2000" dirty="0" err="1" smtClean="0">
@@ -24083,7 +23817,7 @@
           <a:blip r:embed="rId4" cstate="print">
             <a:extLst>
               <a:ext uri="{28A0092B-C50C-407E-A947-70E740481C1C}">
-                <a14:useLocalDpi xmlns:a14="http://schemas.microsoft.com/office/drawing/2010/main" xmlns="" val="0"/>
+                <a14:useLocalDpi xmlns="" xmlns:a14="http://schemas.microsoft.com/office/drawing/2010/main" val="0"/>
               </a:ext>
             </a:extLst>
           </a:blip>
@@ -24107,14 +23841,14 @@
           <a:effectLst/>
           <a:extLst>
             <a:ext uri="{909E8E84-426E-40DD-AFC4-6F175D3DCCD1}">
-              <a14:hiddenFill xmlns:a14="http://schemas.microsoft.com/office/drawing/2010/main" xmlns="">
+              <a14:hiddenFill xmlns="" xmlns:a14="http://schemas.microsoft.com/office/drawing/2010/main">
                 <a:solidFill>
                   <a:schemeClr val="accent1"/>
                 </a:solidFill>
               </a14:hiddenFill>
             </a:ext>
             <a:ext uri="{91240B29-F687-4F45-9708-019B960494DF}">
-              <a14:hiddenLine xmlns:a14="http://schemas.microsoft.com/office/drawing/2010/main" xmlns="" w="9525">
+              <a14:hiddenLine xmlns="" xmlns:a14="http://schemas.microsoft.com/office/drawing/2010/main" w="9525">
                 <a:solidFill>
                   <a:schemeClr val="tx1"/>
                 </a:solidFill>
@@ -24124,7 +23858,7 @@
               </a14:hiddenLine>
             </a:ext>
             <a:ext uri="{AF507438-7753-43E0-B8FC-AC1667EBCBE1}">
-              <a14:hiddenEffects xmlns:a14="http://schemas.microsoft.com/office/drawing/2010/main" xmlns="">
+              <a14:hiddenEffects xmlns="" xmlns:a14="http://schemas.microsoft.com/office/drawing/2010/main">
                 <a:effectLst>
                   <a:outerShdw dist="35921" dir="2700000" algn="ctr" rotWithShape="0">
                     <a:schemeClr val="bg2"/>
@@ -24297,7 +24031,7 @@
     </p:spTree>
     <p:extLst>
       <p:ext uri="{BB962C8B-B14F-4D97-AF65-F5344CB8AC3E}">
-        <p14:creationId xmlns:p14="http://schemas.microsoft.com/office/powerpoint/2010/main" xmlns="" val="4215923739"/>
+        <p14:creationId xmlns="" xmlns:p14="http://schemas.microsoft.com/office/powerpoint/2010/main" val="4215923739"/>
       </p:ext>
     </p:extLst>
   </p:cSld>
@@ -24408,31 +24142,7 @@
                 <a:ea typeface="Tahoma" pitchFamily="34" charset="0"/>
                 <a:cs typeface="Tahoma" pitchFamily="34" charset="0"/>
               </a:rPr>
-              <a:t> </a:t>
-            </a:r>
-            <a:r>
-              <a:rPr lang="en-US" sz="2400" b="1" dirty="0" smtClean="0">
-                <a:latin typeface="Tahoma" pitchFamily="34" charset="0"/>
-                <a:ea typeface="Tahoma" pitchFamily="34" charset="0"/>
-                <a:cs typeface="Tahoma" pitchFamily="34" charset="0"/>
-              </a:rPr>
-              <a:t>(Powered </a:t>
-            </a:r>
-            <a:r>
-              <a:rPr lang="en-US" sz="2400" b="1" dirty="0" smtClean="0">
-                <a:latin typeface="Tahoma" pitchFamily="34" charset="0"/>
-                <a:ea typeface="Tahoma" pitchFamily="34" charset="0"/>
-                <a:cs typeface="Tahoma" pitchFamily="34" charset="0"/>
-              </a:rPr>
-              <a:t>Device </a:t>
-            </a:r>
-            <a:r>
-              <a:rPr lang="en-US" sz="2400" b="1" dirty="0" smtClean="0">
-                <a:latin typeface="Tahoma" pitchFamily="34" charset="0"/>
-                <a:ea typeface="Tahoma" pitchFamily="34" charset="0"/>
-                <a:cs typeface="Tahoma" pitchFamily="34" charset="0"/>
-              </a:rPr>
-              <a:t>– PD)</a:t>
+              <a:t> (Powered Device – PD)</a:t>
             </a:r>
           </a:p>
           <a:p>
@@ -24518,7 +24228,15 @@
                 <a:ea typeface="Tahoma" pitchFamily="34" charset="0"/>
                 <a:cs typeface="Tahoma" pitchFamily="34" charset="0"/>
               </a:rPr>
-              <a:t> </a:t>
+              <a:t> VoIP, um Ponto de </a:t>
+            </a:r>
+            <a:r>
+              <a:rPr lang="en-US" sz="2000" dirty="0" err="1" smtClean="0">
+                <a:latin typeface="Tahoma" pitchFamily="34" charset="0"/>
+                <a:ea typeface="Tahoma" pitchFamily="34" charset="0"/>
+                <a:cs typeface="Tahoma" pitchFamily="34" charset="0"/>
+              </a:rPr>
+              <a:t>Acesso</a:t>
             </a:r>
             <a:r>
               <a:rPr lang="en-US" sz="2000" dirty="0" smtClean="0">
@@ -24526,39 +24244,7 @@
                 <a:ea typeface="Tahoma" pitchFamily="34" charset="0"/>
                 <a:cs typeface="Tahoma" pitchFamily="34" charset="0"/>
               </a:rPr>
-              <a:t>VoIP, um </a:t>
-            </a:r>
-            <a:r>
-              <a:rPr lang="en-US" sz="2000" dirty="0" smtClean="0">
-                <a:latin typeface="Tahoma" pitchFamily="34" charset="0"/>
-                <a:ea typeface="Tahoma" pitchFamily="34" charset="0"/>
-                <a:cs typeface="Tahoma" pitchFamily="34" charset="0"/>
-              </a:rPr>
-              <a:t>Ponto de </a:t>
-            </a:r>
-            <a:r>
-              <a:rPr lang="en-US" sz="2000" dirty="0" err="1" smtClean="0">
-                <a:latin typeface="Tahoma" pitchFamily="34" charset="0"/>
-                <a:ea typeface="Tahoma" pitchFamily="34" charset="0"/>
-                <a:cs typeface="Tahoma" pitchFamily="34" charset="0"/>
-              </a:rPr>
-              <a:t>Acesso</a:t>
-            </a:r>
-            <a:r>
-              <a:rPr lang="en-US" sz="2000" dirty="0" smtClean="0">
-                <a:latin typeface="Tahoma" pitchFamily="34" charset="0"/>
-                <a:ea typeface="Tahoma" pitchFamily="34" charset="0"/>
-                <a:cs typeface="Tahoma" pitchFamily="34" charset="0"/>
-              </a:rPr>
-              <a:t> </a:t>
-            </a:r>
-            <a:r>
-              <a:rPr lang="en-US" sz="2000" dirty="0" smtClean="0">
-                <a:latin typeface="Tahoma" pitchFamily="34" charset="0"/>
-                <a:ea typeface="Tahoma" pitchFamily="34" charset="0"/>
-                <a:cs typeface="Tahoma" pitchFamily="34" charset="0"/>
-              </a:rPr>
-              <a:t>Wi-Fi, entre </a:t>
+              <a:t> Wi-Fi, entre </a:t>
             </a:r>
             <a:r>
               <a:rPr lang="en-US" sz="2000" dirty="0" err="1" smtClean="0">
@@ -24852,7 +24538,15 @@
                 <a:ea typeface="Tahoma" pitchFamily="34" charset="0"/>
                 <a:cs typeface="Tahoma" pitchFamily="34" charset="0"/>
               </a:rPr>
-              <a:t> com </a:t>
+              <a:t> com 802.3af </a:t>
+            </a:r>
+            <a:r>
+              <a:rPr lang="en-US" sz="2000" dirty="0" err="1" smtClean="0">
+                <a:latin typeface="Tahoma" pitchFamily="34" charset="0"/>
+                <a:ea typeface="Tahoma" pitchFamily="34" charset="0"/>
+                <a:cs typeface="Tahoma" pitchFamily="34" charset="0"/>
+              </a:rPr>
+              <a:t>ou</a:t>
             </a:r>
             <a:r>
               <a:rPr lang="en-US" sz="2000" dirty="0" smtClean="0">
@@ -24860,39 +24554,7 @@
                 <a:ea typeface="Tahoma" pitchFamily="34" charset="0"/>
                 <a:cs typeface="Tahoma" pitchFamily="34" charset="0"/>
               </a:rPr>
-              <a:t>802.3af </a:t>
-            </a:r>
-            <a:r>
-              <a:rPr lang="en-US" sz="2000" dirty="0" err="1" smtClean="0">
-                <a:latin typeface="Tahoma" pitchFamily="34" charset="0"/>
-                <a:ea typeface="Tahoma" pitchFamily="34" charset="0"/>
-                <a:cs typeface="Tahoma" pitchFamily="34" charset="0"/>
-              </a:rPr>
-              <a:t>ou</a:t>
-            </a:r>
-            <a:r>
-              <a:rPr lang="en-US" sz="2000" dirty="0" smtClean="0">
-                <a:latin typeface="Tahoma" pitchFamily="34" charset="0"/>
-                <a:ea typeface="Tahoma" pitchFamily="34" charset="0"/>
-                <a:cs typeface="Tahoma" pitchFamily="34" charset="0"/>
-              </a:rPr>
-              <a:t> </a:t>
-            </a:r>
-            <a:r>
-              <a:rPr lang="en-US" sz="2000" dirty="0" smtClean="0">
-                <a:latin typeface="Tahoma" pitchFamily="34" charset="0"/>
-                <a:ea typeface="Tahoma" pitchFamily="34" charset="0"/>
-                <a:cs typeface="Tahoma" pitchFamily="34" charset="0"/>
-              </a:rPr>
-              <a:t>802.3at </a:t>
-            </a:r>
-            <a:r>
-              <a:rPr lang="en-US" sz="2000" dirty="0" smtClean="0">
-                <a:latin typeface="Tahoma" pitchFamily="34" charset="0"/>
-                <a:ea typeface="Tahoma" pitchFamily="34" charset="0"/>
-                <a:cs typeface="Tahoma" pitchFamily="34" charset="0"/>
-              </a:rPr>
-              <a:t> </a:t>
+              <a:t> 802.3at  </a:t>
             </a:r>
             <a:r>
               <a:rPr lang="en-US" sz="2000" dirty="0" err="1" smtClean="0">
@@ -25304,7 +24966,7 @@
           <a:blip r:embed="rId4" cstate="print">
             <a:extLst>
               <a:ext uri="{28A0092B-C50C-407E-A947-70E740481C1C}">
-                <a14:useLocalDpi xmlns:a14="http://schemas.microsoft.com/office/drawing/2010/main" xmlns="" val="0"/>
+                <a14:useLocalDpi xmlns="" xmlns:a14="http://schemas.microsoft.com/office/drawing/2010/main" val="0"/>
               </a:ext>
             </a:extLst>
           </a:blip>
@@ -25328,14 +24990,14 @@
           <a:effectLst/>
           <a:extLst>
             <a:ext uri="{909E8E84-426E-40DD-AFC4-6F175D3DCCD1}">
-              <a14:hiddenFill xmlns:a14="http://schemas.microsoft.com/office/drawing/2010/main" xmlns="">
+              <a14:hiddenFill xmlns="" xmlns:a14="http://schemas.microsoft.com/office/drawing/2010/main">
                 <a:solidFill>
                   <a:schemeClr val="accent1"/>
                 </a:solidFill>
               </a14:hiddenFill>
             </a:ext>
             <a:ext uri="{91240B29-F687-4F45-9708-019B960494DF}">
-              <a14:hiddenLine xmlns:a14="http://schemas.microsoft.com/office/drawing/2010/main" xmlns="" w="9525">
+              <a14:hiddenLine xmlns="" xmlns:a14="http://schemas.microsoft.com/office/drawing/2010/main" w="9525">
                 <a:solidFill>
                   <a:schemeClr val="tx1"/>
                 </a:solidFill>
@@ -25345,7 +25007,7 @@
               </a14:hiddenLine>
             </a:ext>
             <a:ext uri="{AF507438-7753-43E0-B8FC-AC1667EBCBE1}">
-              <a14:hiddenEffects xmlns:a14="http://schemas.microsoft.com/office/drawing/2010/main" xmlns="">
+              <a14:hiddenEffects xmlns="" xmlns:a14="http://schemas.microsoft.com/office/drawing/2010/main">
                 <a:effectLst>
                   <a:outerShdw dist="35921" dir="2700000" algn="ctr" rotWithShape="0">
                     <a:schemeClr val="bg2"/>
@@ -25426,7 +25088,7 @@
     </p:spTree>
     <p:extLst>
       <p:ext uri="{BB962C8B-B14F-4D97-AF65-F5344CB8AC3E}">
-        <p14:creationId xmlns:p14="http://schemas.microsoft.com/office/powerpoint/2010/main" xmlns="" val="2457788653"/>
+        <p14:creationId xmlns="" xmlns:p14="http://schemas.microsoft.com/office/powerpoint/2010/main" val="2457788653"/>
       </p:ext>
     </p:extLst>
   </p:cSld>
@@ -25547,7 +25209,15 @@
                 <a:ea typeface="Tahoma" pitchFamily="34" charset="0"/>
                 <a:cs typeface="Tahoma" pitchFamily="34" charset="0"/>
               </a:rPr>
-              <a:t>O</a:t>
+              <a:t>O </a:t>
+            </a:r>
+            <a:r>
+              <a:rPr lang="en-US" sz="2000" dirty="0" err="1" smtClean="0">
+                <a:latin typeface="Tahoma" pitchFamily="34" charset="0"/>
+                <a:ea typeface="Tahoma" pitchFamily="34" charset="0"/>
+                <a:cs typeface="Tahoma" pitchFamily="34" charset="0"/>
+              </a:rPr>
+              <a:t>cabeamento</a:t>
             </a:r>
             <a:r>
               <a:rPr lang="en-US" sz="2000" dirty="0" smtClean="0">
@@ -25555,7 +25225,23 @@
                 <a:ea typeface="Tahoma" pitchFamily="34" charset="0"/>
                 <a:cs typeface="Tahoma" pitchFamily="34" charset="0"/>
               </a:rPr>
-              <a:t> </a:t>
+              <a:t> Ethernet CAT </a:t>
+            </a:r>
+            <a:r>
+              <a:rPr lang="en-US" sz="2000" dirty="0">
+                <a:latin typeface="Tahoma" pitchFamily="34" charset="0"/>
+                <a:ea typeface="Tahoma" pitchFamily="34" charset="0"/>
+                <a:cs typeface="Tahoma" pitchFamily="34" charset="0"/>
+              </a:rPr>
+              <a:t>5 </a:t>
+            </a:r>
+            <a:r>
+              <a:rPr lang="en-US" sz="2000" dirty="0" smtClean="0">
+                <a:latin typeface="Tahoma" pitchFamily="34" charset="0"/>
+                <a:ea typeface="Tahoma" pitchFamily="34" charset="0"/>
+                <a:cs typeface="Tahoma" pitchFamily="34" charset="0"/>
+              </a:rPr>
+              <a:t>(5E </a:t>
             </a:r>
             <a:r>
               <a:rPr lang="en-US" sz="2000" dirty="0" err="1" smtClean="0">
@@ -25563,7 +25249,15 @@
                 <a:ea typeface="Tahoma" pitchFamily="34" charset="0"/>
                 <a:cs typeface="Tahoma" pitchFamily="34" charset="0"/>
               </a:rPr>
-              <a:t>c</a:t>
+              <a:t>ou</a:t>
+            </a:r>
+            <a:r>
+              <a:rPr lang="en-US" sz="2000" dirty="0" smtClean="0">
+                <a:latin typeface="Tahoma" pitchFamily="34" charset="0"/>
+                <a:ea typeface="Tahoma" pitchFamily="34" charset="0"/>
+                <a:cs typeface="Tahoma" pitchFamily="34" charset="0"/>
+              </a:rPr>
+              <a:t> 6) </a:t>
             </a:r>
             <a:r>
               <a:rPr lang="en-US" sz="2000" dirty="0" err="1" smtClean="0">
@@ -25571,7 +25265,7 @@
                 <a:ea typeface="Tahoma" pitchFamily="34" charset="0"/>
                 <a:cs typeface="Tahoma" pitchFamily="34" charset="0"/>
               </a:rPr>
-              <a:t>abeamento</a:t>
+              <a:t>deve</a:t>
             </a:r>
             <a:r>
               <a:rPr lang="en-US" sz="2000" dirty="0" smtClean="0">
@@ -25579,15 +25273,15 @@
                 <a:ea typeface="Tahoma" pitchFamily="34" charset="0"/>
                 <a:cs typeface="Tahoma" pitchFamily="34" charset="0"/>
               </a:rPr>
-              <a:t> Ethernet CAT </a:t>
-            </a:r>
-            <a:r>
-              <a:rPr lang="en-US" sz="2000" dirty="0">
-                <a:latin typeface="Tahoma" pitchFamily="34" charset="0"/>
-                <a:ea typeface="Tahoma" pitchFamily="34" charset="0"/>
-                <a:cs typeface="Tahoma" pitchFamily="34" charset="0"/>
-              </a:rPr>
-              <a:t>5 </a:t>
+              <a:t> ser </a:t>
+            </a:r>
+            <a:r>
+              <a:rPr lang="en-US" sz="2000" dirty="0" err="1" smtClean="0">
+                <a:latin typeface="Tahoma" pitchFamily="34" charset="0"/>
+                <a:ea typeface="Tahoma" pitchFamily="34" charset="0"/>
+                <a:cs typeface="Tahoma" pitchFamily="34" charset="0"/>
+              </a:rPr>
+              <a:t>usado</a:t>
             </a:r>
             <a:r>
               <a:rPr lang="en-US" sz="2000" dirty="0" smtClean="0">
@@ -25595,7 +25289,7 @@
                 <a:ea typeface="Tahoma" pitchFamily="34" charset="0"/>
                 <a:cs typeface="Tahoma" pitchFamily="34" charset="0"/>
               </a:rPr>
-              <a:t>(5E </a:t>
+              <a:t>. A </a:t>
             </a:r>
             <a:r>
               <a:rPr lang="en-US" sz="2000" dirty="0" err="1" smtClean="0">
@@ -25603,7 +25297,7 @@
                 <a:ea typeface="Tahoma" pitchFamily="34" charset="0"/>
                 <a:cs typeface="Tahoma" pitchFamily="34" charset="0"/>
               </a:rPr>
-              <a:t>ou</a:t>
+              <a:t>vantagem</a:t>
             </a:r>
             <a:r>
               <a:rPr lang="en-US" sz="2000" dirty="0" smtClean="0">
@@ -25611,7 +25305,7 @@
                 <a:ea typeface="Tahoma" pitchFamily="34" charset="0"/>
                 <a:cs typeface="Tahoma" pitchFamily="34" charset="0"/>
               </a:rPr>
-              <a:t> 6) </a:t>
+              <a:t> do </a:t>
             </a:r>
             <a:r>
               <a:rPr lang="en-US" sz="2000" dirty="0" err="1" smtClean="0">
@@ -25619,7 +25313,7 @@
                 <a:ea typeface="Tahoma" pitchFamily="34" charset="0"/>
                 <a:cs typeface="Tahoma" pitchFamily="34" charset="0"/>
               </a:rPr>
-              <a:t>deve</a:t>
+              <a:t>cabo</a:t>
             </a:r>
             <a:r>
               <a:rPr lang="en-US" sz="2000" dirty="0" smtClean="0">
@@ -25627,7 +25321,7 @@
                 <a:ea typeface="Tahoma" pitchFamily="34" charset="0"/>
                 <a:cs typeface="Tahoma" pitchFamily="34" charset="0"/>
               </a:rPr>
-              <a:t> ser </a:t>
+              <a:t> de par </a:t>
             </a:r>
             <a:r>
               <a:rPr lang="en-US" sz="2000" dirty="0" err="1" smtClean="0">
@@ -25635,7 +25329,7 @@
                 <a:ea typeface="Tahoma" pitchFamily="34" charset="0"/>
                 <a:cs typeface="Tahoma" pitchFamily="34" charset="0"/>
               </a:rPr>
-              <a:t>usado</a:t>
+              <a:t>trançado</a:t>
             </a:r>
             <a:r>
               <a:rPr lang="en-US" sz="2000" dirty="0" smtClean="0">
@@ -25643,71 +25337,7 @@
                 <a:ea typeface="Tahoma" pitchFamily="34" charset="0"/>
                 <a:cs typeface="Tahoma" pitchFamily="34" charset="0"/>
               </a:rPr>
-              <a:t>. A </a:t>
-            </a:r>
-            <a:r>
-              <a:rPr lang="en-US" sz="2000" dirty="0" err="1" smtClean="0">
-                <a:latin typeface="Tahoma" pitchFamily="34" charset="0"/>
-                <a:ea typeface="Tahoma" pitchFamily="34" charset="0"/>
-                <a:cs typeface="Tahoma" pitchFamily="34" charset="0"/>
-              </a:rPr>
-              <a:t>vantagem</a:t>
-            </a:r>
-            <a:r>
-              <a:rPr lang="en-US" sz="2000" dirty="0" smtClean="0">
-                <a:latin typeface="Tahoma" pitchFamily="34" charset="0"/>
-                <a:ea typeface="Tahoma" pitchFamily="34" charset="0"/>
-                <a:cs typeface="Tahoma" pitchFamily="34" charset="0"/>
-              </a:rPr>
-              <a:t> do </a:t>
-            </a:r>
-            <a:r>
-              <a:rPr lang="en-US" sz="2000" dirty="0" err="1" smtClean="0">
-                <a:latin typeface="Tahoma" pitchFamily="34" charset="0"/>
-                <a:ea typeface="Tahoma" pitchFamily="34" charset="0"/>
-                <a:cs typeface="Tahoma" pitchFamily="34" charset="0"/>
-              </a:rPr>
-              <a:t>cabo</a:t>
-            </a:r>
-            <a:r>
-              <a:rPr lang="en-US" sz="2000" dirty="0" smtClean="0">
-                <a:latin typeface="Tahoma" pitchFamily="34" charset="0"/>
-                <a:ea typeface="Tahoma" pitchFamily="34" charset="0"/>
-                <a:cs typeface="Tahoma" pitchFamily="34" charset="0"/>
-              </a:rPr>
-              <a:t> de </a:t>
-            </a:r>
-            <a:r>
-              <a:rPr lang="en-US" sz="2000" dirty="0" smtClean="0">
-                <a:latin typeface="Tahoma" pitchFamily="34" charset="0"/>
-                <a:ea typeface="Tahoma" pitchFamily="34" charset="0"/>
-                <a:cs typeface="Tahoma" pitchFamily="34" charset="0"/>
-              </a:rPr>
-              <a:t>par </a:t>
-            </a:r>
-            <a:r>
-              <a:rPr lang="en-US" sz="2000" dirty="0" err="1" smtClean="0">
-                <a:latin typeface="Tahoma" pitchFamily="34" charset="0"/>
-                <a:ea typeface="Tahoma" pitchFamily="34" charset="0"/>
-                <a:cs typeface="Tahoma" pitchFamily="34" charset="0"/>
-              </a:rPr>
-              <a:t>trançado</a:t>
-            </a:r>
-            <a:r>
-              <a:rPr lang="en-US" sz="2000" dirty="0" smtClean="0">
-                <a:latin typeface="Tahoma" pitchFamily="34" charset="0"/>
-                <a:ea typeface="Tahoma" pitchFamily="34" charset="0"/>
-                <a:cs typeface="Tahoma" pitchFamily="34" charset="0"/>
-              </a:rPr>
-              <a:t> </a:t>
-            </a:r>
-            <a:r>
-              <a:rPr lang="en-US" sz="2000" dirty="0" smtClean="0">
-                <a:latin typeface="Tahoma" pitchFamily="34" charset="0"/>
-                <a:ea typeface="Tahoma" pitchFamily="34" charset="0"/>
-                <a:cs typeface="Tahoma" pitchFamily="34" charset="0"/>
-              </a:rPr>
-              <a:t>é o </a:t>
+              <a:t> é o </a:t>
             </a:r>
             <a:r>
               <a:rPr lang="en-US" sz="2000" dirty="0" err="1" smtClean="0">
@@ -26179,7 +25809,7 @@
     </p:spTree>
     <p:extLst>
       <p:ext uri="{BB962C8B-B14F-4D97-AF65-F5344CB8AC3E}">
-        <p14:creationId xmlns:p14="http://schemas.microsoft.com/office/powerpoint/2010/main" xmlns="" val="1447303590"/>
+        <p14:creationId xmlns="" xmlns:p14="http://schemas.microsoft.com/office/powerpoint/2010/main" val="1447303590"/>
       </p:ext>
     </p:extLst>
   </p:cSld>

</xml_diff>